<commit_message>
update willpower presentation part 2
</commit_message>
<xml_diff>
--- a/softskills/willpower/willpower.pptx
+++ b/softskills/willpower/willpower.pptx
@@ -5,7 +5,7 @@
     <p:sldMasterId id="2147483648" r:id="rId1"/>
   </p:sldMasterIdLst>
   <p:notesMasterIdLst>
-    <p:notesMasterId r:id="rId65"/>
+    <p:notesMasterId r:id="rId67"/>
   </p:notesMasterIdLst>
   <p:sldIdLst>
     <p:sldId id="256" r:id="rId2"/>
@@ -41,36 +41,38 @@
     <p:sldId id="340" r:id="rId32"/>
     <p:sldId id="341" r:id="rId33"/>
     <p:sldId id="342" r:id="rId34"/>
-    <p:sldId id="343" r:id="rId35"/>
-    <p:sldId id="349" r:id="rId36"/>
-    <p:sldId id="345" r:id="rId37"/>
-    <p:sldId id="350" r:id="rId38"/>
-    <p:sldId id="346" r:id="rId39"/>
-    <p:sldId id="317" r:id="rId40"/>
-    <p:sldId id="321" r:id="rId41"/>
-    <p:sldId id="266" r:id="rId42"/>
-    <p:sldId id="267" r:id="rId43"/>
-    <p:sldId id="318" r:id="rId44"/>
-    <p:sldId id="287" r:id="rId45"/>
-    <p:sldId id="288" r:id="rId46"/>
-    <p:sldId id="289" r:id="rId47"/>
-    <p:sldId id="294" r:id="rId48"/>
-    <p:sldId id="348" r:id="rId49"/>
-    <p:sldId id="291" r:id="rId50"/>
-    <p:sldId id="292" r:id="rId51"/>
-    <p:sldId id="293" r:id="rId52"/>
-    <p:sldId id="277" r:id="rId53"/>
-    <p:sldId id="306" r:id="rId54"/>
-    <p:sldId id="305" r:id="rId55"/>
-    <p:sldId id="284" r:id="rId56"/>
-    <p:sldId id="278" r:id="rId57"/>
-    <p:sldId id="279" r:id="rId58"/>
-    <p:sldId id="280" r:id="rId59"/>
-    <p:sldId id="281" r:id="rId60"/>
-    <p:sldId id="282" r:id="rId61"/>
-    <p:sldId id="283" r:id="rId62"/>
-    <p:sldId id="347" r:id="rId63"/>
-    <p:sldId id="285" r:id="rId64"/>
+    <p:sldId id="351" r:id="rId35"/>
+    <p:sldId id="343" r:id="rId36"/>
+    <p:sldId id="349" r:id="rId37"/>
+    <p:sldId id="345" r:id="rId38"/>
+    <p:sldId id="350" r:id="rId39"/>
+    <p:sldId id="346" r:id="rId40"/>
+    <p:sldId id="317" r:id="rId41"/>
+    <p:sldId id="352" r:id="rId42"/>
+    <p:sldId id="321" r:id="rId43"/>
+    <p:sldId id="266" r:id="rId44"/>
+    <p:sldId id="267" r:id="rId45"/>
+    <p:sldId id="318" r:id="rId46"/>
+    <p:sldId id="287" r:id="rId47"/>
+    <p:sldId id="288" r:id="rId48"/>
+    <p:sldId id="289" r:id="rId49"/>
+    <p:sldId id="294" r:id="rId50"/>
+    <p:sldId id="348" r:id="rId51"/>
+    <p:sldId id="291" r:id="rId52"/>
+    <p:sldId id="292" r:id="rId53"/>
+    <p:sldId id="293" r:id="rId54"/>
+    <p:sldId id="277" r:id="rId55"/>
+    <p:sldId id="306" r:id="rId56"/>
+    <p:sldId id="305" r:id="rId57"/>
+    <p:sldId id="284" r:id="rId58"/>
+    <p:sldId id="278" r:id="rId59"/>
+    <p:sldId id="279" r:id="rId60"/>
+    <p:sldId id="280" r:id="rId61"/>
+    <p:sldId id="281" r:id="rId62"/>
+    <p:sldId id="282" r:id="rId63"/>
+    <p:sldId id="283" r:id="rId64"/>
+    <p:sldId id="347" r:id="rId65"/>
+    <p:sldId id="285" r:id="rId66"/>
   </p:sldIdLst>
   <p:sldSz cx="12192000" cy="6858000"/>
   <p:notesSz cx="6858000" cy="9144000"/>
@@ -259,7 +261,7 @@
           <a:p>
             <a:fld id="{F1E91201-0078-4A3F-BC02-68DABEF5C8BB}" type="datetimeFigureOut">
               <a:rPr lang="en-US" smtClean="0"/>
-              <a:t>2/4/2021</a:t>
+              <a:t>2/5/2021</a:t>
             </a:fld>
             <a:endParaRPr lang="en-US"/>
           </a:p>
@@ -4527,7 +4529,23 @@
           <a:p>
             <a:r>
               <a:rPr lang="ru-RU" dirty="0"/>
-              <a:t>Стресс.</a:t>
+              <a:t>в</a:t>
+            </a:r>
+            <a:r>
+              <a:rPr lang="en-US" dirty="0"/>
+              <a:t> 1953 </a:t>
+            </a:r>
+            <a:r>
+              <a:rPr lang="ru-RU" dirty="0"/>
+              <a:t>году Джеймс Олдс и Питер Милнер</a:t>
+            </a:r>
+            <a:r>
+              <a:rPr lang="en-US" dirty="0"/>
+              <a:t> </a:t>
+            </a:r>
+            <a:r>
+              <a:rPr lang="ru-RU" dirty="0"/>
+              <a:t>эксперимент на крысах</a:t>
             </a:r>
           </a:p>
           <a:p>
@@ -4536,7 +4554,7 @@
           <a:p>
             <a:r>
               <a:rPr lang="ru-RU" dirty="0"/>
-              <a:t>Бей или беги.</a:t>
+              <a:t>Роберт Хит и эксперемент на человеке</a:t>
             </a:r>
           </a:p>
           <a:p>
@@ -4545,7 +4563,13 @@
           <a:p>
             <a:r>
               <a:rPr lang="ru-RU" dirty="0"/>
-              <a:t>Обещание награды в купе с обещаением утешения.</a:t>
+              <a:t>Нейромаркетинг. </a:t>
+            </a:r>
+          </a:p>
+          <a:p>
+            <a:r>
+              <a:rPr lang="ru-RU" dirty="0"/>
+              <a:t>Реклама.</a:t>
             </a:r>
           </a:p>
           <a:p>
@@ -4554,7 +4578,7 @@
           <a:p>
             <a:r>
               <a:rPr lang="ru-RU" dirty="0"/>
-              <a:t>Страшные картинки на пачке с сигаретами.</a:t>
+              <a:t>Вот почему когда вы приходите домой после покупок, и некоторые покупки не радуют так как они радовали в магазине.</a:t>
             </a:r>
           </a:p>
           <a:p>
@@ -4563,7 +4587,7 @@
           <a:p>
             <a:r>
               <a:rPr lang="ru-RU" dirty="0"/>
-              <a:t>Эффект какого черта.</a:t>
+              <a:t>Главная функция Дофамина – заставить нас гнаться за счастьем а не сделать счастливыми.</a:t>
             </a:r>
           </a:p>
           <a:p>
@@ -4572,7 +4596,7 @@
           <a:p>
             <a:r>
               <a:rPr lang="ru-RU" dirty="0"/>
-              <a:t>Вина, стыд, безнадежность, потеря контроля и тп.</a:t>
+              <a:t>Но что если подавить этот нейромедиатор, будет ли лучше?</a:t>
             </a:r>
           </a:p>
           <a:p>
@@ -4581,49 +4605,10 @@
           <a:p>
             <a:r>
               <a:rPr lang="ru-RU" dirty="0"/>
-              <a:t>Когда мы проигрываем в волевых испытаниях, мы часто виним себя: мы слабые, безвольные тюфяки. </a:t>
-            </a:r>
-            <a:r>
-              <a:rPr lang="ru-RU"/>
-              <a:t>Но зачастую проблема в том что наш мозг и тело пребывают в неподходящем для самоконтроля состоянии.</a:t>
-            </a:r>
-            <a:endParaRPr lang="ru-RU" dirty="0"/>
-          </a:p>
-          <a:p>
-            <a:endParaRPr lang="ru-RU" dirty="0"/>
-          </a:p>
-          <a:p>
-            <a:r>
-              <a:rPr lang="ru-RU" dirty="0"/>
-              <a:t>Решение: прощение и не корить себя за ошибки, а признать что ты всего лишь человек и не идеален.</a:t>
-            </a:r>
-          </a:p>
-          <a:p>
-            <a:endParaRPr lang="ru-RU" dirty="0"/>
-          </a:p>
-          <a:p>
-            <a:r>
-              <a:rPr lang="ru-RU" dirty="0"/>
-              <a:t>Но мы часто думаем что мы сорвались потому что не сильно строги к себе, жестки. Занимаемся самоедством.</a:t>
-            </a:r>
-          </a:p>
-          <a:p>
-            <a:endParaRPr lang="ru-RU" dirty="0"/>
-          </a:p>
-          <a:p>
-            <a:r>
-              <a:rPr lang="ru-RU" dirty="0"/>
-              <a:t>Прощай себя когда ошибаешся.</a:t>
-            </a:r>
-          </a:p>
-          <a:p>
-            <a:endParaRPr lang="ru-RU" dirty="0"/>
-          </a:p>
-          <a:p>
-            <a:r>
-              <a:rPr lang="ru-RU" dirty="0"/>
-              <a:t> </a:t>
-            </a:r>
+              <a:t>Осознанность. И учиться находить это.</a:t>
+            </a:r>
+          </a:p>
+          <a:p>
             <a:endParaRPr lang="en-US" dirty="0"/>
           </a:p>
         </p:txBody>
@@ -4654,7 +4639,7 @@
     </p:spTree>
     <p:extLst>
       <p:ext uri="{BB962C8B-B14F-4D97-AF65-F5344CB8AC3E}">
-        <p14:creationId xmlns:p14="http://schemas.microsoft.com/office/powerpoint/2010/main" val="2603442122"/>
+        <p14:creationId xmlns:p14="http://schemas.microsoft.com/office/powerpoint/2010/main" val="296543143"/>
       </p:ext>
     </p:extLst>
   </p:cSld>
@@ -4710,13 +4695,16 @@
           <a:p>
             <a:r>
               <a:rPr lang="ru-RU" dirty="0"/>
-              <a:t>19 шимпанзе или 40 студентов Гарворда.</a:t>
-            </a:r>
+              <a:t>Стресс.</a:t>
+            </a:r>
+          </a:p>
+          <a:p>
+            <a:endParaRPr lang="ru-RU" dirty="0"/>
           </a:p>
           <a:p>
             <a:r>
               <a:rPr lang="ru-RU" dirty="0"/>
-              <a:t>2 сейчас или 6 потом. Теория и Реальность.</a:t>
+              <a:t>Бей или беги.</a:t>
             </a:r>
           </a:p>
           <a:p>
@@ -4725,7 +4713,7 @@
           <a:p>
             <a:r>
               <a:rPr lang="ru-RU" dirty="0"/>
-              <a:t>Проблема рациональности.</a:t>
+              <a:t>Обещание награды в купе с обещаением утешения. </a:t>
             </a:r>
           </a:p>
           <a:p>
@@ -4734,7 +4722,7 @@
           <a:p>
             <a:r>
               <a:rPr lang="ru-RU" dirty="0"/>
-              <a:t>Экономисты. Обесценивание при задержке.</a:t>
+              <a:t>Страшные картинки на пачке с сигаретами.</a:t>
             </a:r>
           </a:p>
           <a:p>
@@ -4743,7 +4731,7 @@
           <a:p>
             <a:r>
               <a:rPr lang="ru-RU" dirty="0"/>
-              <a:t>Наша система подкрепления не умеет реагировать на будущие блага.</a:t>
+              <a:t>Эффект какого черта.</a:t>
             </a:r>
           </a:p>
           <a:p>
@@ -4751,8 +4739,302 @@
           </a:p>
           <a:p>
             <a:r>
+              <a:rPr lang="en-US" sz="1800" b="1" dirty="0" err="1">
+                <a:effectLst/>
+                <a:latin typeface="Calibri" panose="020F0502020204030204" pitchFamily="34" charset="0"/>
+              </a:rPr>
+              <a:t>Эффект</a:t>
+            </a:r>
+            <a:r>
+              <a:rPr lang="en-US" sz="1800" b="1" dirty="0">
+                <a:effectLst/>
+                <a:latin typeface="Calibri" panose="020F0502020204030204" pitchFamily="34" charset="0"/>
+              </a:rPr>
+              <a:t> «</a:t>
+            </a:r>
+            <a:r>
+              <a:rPr lang="en-US" sz="1800" b="1" dirty="0" err="1">
+                <a:effectLst/>
+                <a:latin typeface="Calibri" panose="020F0502020204030204" pitchFamily="34" charset="0"/>
+              </a:rPr>
+              <a:t>какого</a:t>
+            </a:r>
+            <a:r>
+              <a:rPr lang="en-US" sz="1800" b="1" dirty="0">
+                <a:effectLst/>
+                <a:latin typeface="Calibri" panose="020F0502020204030204" pitchFamily="34" charset="0"/>
+              </a:rPr>
+              <a:t> </a:t>
+            </a:r>
+            <a:r>
+              <a:rPr lang="en-US" sz="1800" b="1" dirty="0" err="1">
+                <a:effectLst/>
+                <a:latin typeface="Calibri" panose="020F0502020204030204" pitchFamily="34" charset="0"/>
+              </a:rPr>
+              <a:t>черта</a:t>
+            </a:r>
+            <a:r>
+              <a:rPr lang="en-US" sz="1800" b="1" dirty="0">
+                <a:effectLst/>
+                <a:latin typeface="Calibri" panose="020F0502020204030204" pitchFamily="34" charset="0"/>
+              </a:rPr>
+              <a:t>» </a:t>
+            </a:r>
+            <a:r>
+              <a:rPr lang="en-US" sz="1800" b="1" dirty="0" err="1">
+                <a:effectLst/>
+                <a:latin typeface="Calibri" panose="020F0502020204030204" pitchFamily="34" charset="0"/>
+              </a:rPr>
+              <a:t>состоит</a:t>
+            </a:r>
+            <a:r>
+              <a:rPr lang="en-US" sz="1800" b="1" dirty="0">
+                <a:effectLst/>
+                <a:latin typeface="Calibri" panose="020F0502020204030204" pitchFamily="34" charset="0"/>
+              </a:rPr>
+              <a:t> </a:t>
+            </a:r>
+            <a:r>
+              <a:rPr lang="en-US" sz="1800" b="1" dirty="0" err="1">
+                <a:effectLst/>
+                <a:latin typeface="Calibri" panose="020F0502020204030204" pitchFamily="34" charset="0"/>
+              </a:rPr>
+              <a:t>из</a:t>
+            </a:r>
+            <a:r>
+              <a:rPr lang="en-US" sz="1800" b="1" dirty="0">
+                <a:effectLst/>
+                <a:latin typeface="Calibri" panose="020F0502020204030204" pitchFamily="34" charset="0"/>
+              </a:rPr>
+              <a:t> </a:t>
+            </a:r>
+            <a:r>
+              <a:rPr lang="en-US" sz="1800" b="1" dirty="0" err="1">
+                <a:effectLst/>
+                <a:latin typeface="Calibri" panose="020F0502020204030204" pitchFamily="34" charset="0"/>
+              </a:rPr>
+              <a:t>цикла</a:t>
+            </a:r>
+            <a:r>
+              <a:rPr lang="en-US" sz="1800" b="1" dirty="0">
+                <a:effectLst/>
+                <a:latin typeface="Calibri" panose="020F0502020204030204" pitchFamily="34" charset="0"/>
+              </a:rPr>
+              <a:t> </a:t>
+            </a:r>
+            <a:r>
+              <a:rPr lang="en-US" sz="1800" b="1" dirty="0" err="1">
+                <a:effectLst/>
+                <a:latin typeface="Calibri" panose="020F0502020204030204" pitchFamily="34" charset="0"/>
+              </a:rPr>
+              <a:t>поблажек</a:t>
+            </a:r>
+            <a:r>
+              <a:rPr lang="en-US" sz="1800" b="1" dirty="0">
+                <a:effectLst/>
+                <a:latin typeface="Calibri" panose="020F0502020204030204" pitchFamily="34" charset="0"/>
+              </a:rPr>
+              <a:t>, </a:t>
+            </a:r>
+            <a:r>
+              <a:rPr lang="en-US" sz="1800" b="1" dirty="0" err="1">
+                <a:effectLst/>
+                <a:latin typeface="Calibri" panose="020F0502020204030204" pitchFamily="34" charset="0"/>
+              </a:rPr>
+              <a:t>сожаления</a:t>
+            </a:r>
+            <a:r>
+              <a:rPr lang="en-US" sz="1800" b="1" dirty="0">
+                <a:effectLst/>
+                <a:latin typeface="Calibri" panose="020F0502020204030204" pitchFamily="34" charset="0"/>
+              </a:rPr>
+              <a:t> и </a:t>
+            </a:r>
+            <a:r>
+              <a:rPr lang="en-US" sz="1800" b="1" dirty="0" err="1">
+                <a:effectLst/>
+                <a:latin typeface="Calibri" panose="020F0502020204030204" pitchFamily="34" charset="0"/>
+              </a:rPr>
+              <a:t>еще</a:t>
+            </a:r>
+            <a:r>
+              <a:rPr lang="en-US" sz="1800" b="1" dirty="0">
+                <a:effectLst/>
+                <a:latin typeface="Calibri" panose="020F0502020204030204" pitchFamily="34" charset="0"/>
+              </a:rPr>
+              <a:t> </a:t>
+            </a:r>
+            <a:r>
+              <a:rPr lang="en-US" sz="1800" b="1" dirty="0" err="1">
+                <a:effectLst/>
+                <a:latin typeface="Calibri" panose="020F0502020204030204" pitchFamily="34" charset="0"/>
+              </a:rPr>
+              <a:t>больших</a:t>
+            </a:r>
+            <a:r>
+              <a:rPr lang="en-US" sz="1800" b="1" dirty="0">
+                <a:effectLst/>
+                <a:latin typeface="Calibri" panose="020F0502020204030204" pitchFamily="34" charset="0"/>
+              </a:rPr>
+              <a:t> </a:t>
+            </a:r>
+            <a:r>
+              <a:rPr lang="en-US" sz="1800" b="1" dirty="0" err="1">
+                <a:effectLst/>
+                <a:latin typeface="Calibri" panose="020F0502020204030204" pitchFamily="34" charset="0"/>
+              </a:rPr>
+              <a:t>поблаже</a:t>
+            </a:r>
+            <a:r>
+              <a:rPr lang="ru-RU" sz="1800" b="1" dirty="0">
+                <a:effectLst/>
+                <a:latin typeface="Calibri" panose="020F0502020204030204" pitchFamily="34" charset="0"/>
+              </a:rPr>
+              <a:t>к</a:t>
+            </a:r>
+            <a:r>
+              <a:rPr lang="en-US" sz="1800" b="1" dirty="0">
+                <a:effectLst/>
+                <a:latin typeface="Calibri" panose="020F0502020204030204" pitchFamily="34" charset="0"/>
+              </a:rPr>
+              <a:t>. </a:t>
+            </a:r>
+            <a:endParaRPr lang="ru-RU" sz="1800" b="1" dirty="0">
+              <a:effectLst/>
+              <a:latin typeface="Calibri" panose="020F0502020204030204" pitchFamily="34" charset="0"/>
+            </a:endParaRPr>
+          </a:p>
+          <a:p>
+            <a:endParaRPr lang="ru-RU" dirty="0"/>
+          </a:p>
+          <a:p>
+            <a:r>
+              <a:rPr lang="en-US" sz="1800" dirty="0">
+                <a:effectLst/>
+                <a:latin typeface="Calibri" panose="020F0502020204030204" pitchFamily="34" charset="0"/>
+              </a:rPr>
+              <a:t>И </a:t>
+            </a:r>
+            <a:r>
+              <a:rPr lang="en-US" sz="1800" dirty="0" err="1">
+                <a:effectLst/>
+                <a:latin typeface="Calibri" panose="020F0502020204030204" pitchFamily="34" charset="0"/>
+              </a:rPr>
+              <a:t>вместо</a:t>
+            </a:r>
+            <a:r>
+              <a:rPr lang="en-US" sz="1800" dirty="0">
+                <a:effectLst/>
+                <a:latin typeface="Calibri" panose="020F0502020204030204" pitchFamily="34" charset="0"/>
+              </a:rPr>
+              <a:t> </a:t>
+            </a:r>
+            <a:r>
+              <a:rPr lang="en-US" sz="1800" dirty="0" err="1">
+                <a:effectLst/>
+                <a:latin typeface="Calibri" panose="020F0502020204030204" pitchFamily="34" charset="0"/>
+              </a:rPr>
+              <a:t>того</a:t>
+            </a:r>
+            <a:r>
+              <a:rPr lang="en-US" sz="1800" dirty="0">
+                <a:effectLst/>
+                <a:latin typeface="Calibri" panose="020F0502020204030204" pitchFamily="34" charset="0"/>
+              </a:rPr>
+              <a:t> </a:t>
+            </a:r>
+            <a:r>
+              <a:rPr lang="en-US" sz="1800" dirty="0" err="1">
+                <a:effectLst/>
+                <a:latin typeface="Calibri" panose="020F0502020204030204" pitchFamily="34" charset="0"/>
+              </a:rPr>
+              <a:t>чтобы</a:t>
+            </a:r>
+            <a:r>
+              <a:rPr lang="en-US" sz="1800" dirty="0">
+                <a:effectLst/>
+                <a:latin typeface="Calibri" panose="020F0502020204030204" pitchFamily="34" charset="0"/>
+              </a:rPr>
+              <a:t> </a:t>
+            </a:r>
+            <a:r>
+              <a:rPr lang="en-US" sz="1800" dirty="0" err="1">
+                <a:effectLst/>
+                <a:latin typeface="Calibri" panose="020F0502020204030204" pitchFamily="34" charset="0"/>
+              </a:rPr>
+              <a:t>свести</a:t>
+            </a:r>
+            <a:r>
+              <a:rPr lang="en-US" sz="1800" dirty="0">
+                <a:effectLst/>
+                <a:latin typeface="Calibri" panose="020F0502020204030204" pitchFamily="34" charset="0"/>
+              </a:rPr>
+              <a:t> </a:t>
+            </a:r>
+            <a:r>
+              <a:rPr lang="en-US" sz="1800" dirty="0" err="1">
+                <a:effectLst/>
+                <a:latin typeface="Calibri" panose="020F0502020204030204" pitchFamily="34" charset="0"/>
+              </a:rPr>
+              <a:t>ущерб</a:t>
+            </a:r>
+            <a:r>
+              <a:rPr lang="en-US" sz="1800" dirty="0">
+                <a:effectLst/>
+                <a:latin typeface="Calibri" panose="020F0502020204030204" pitchFamily="34" charset="0"/>
+              </a:rPr>
+              <a:t> к </a:t>
+            </a:r>
+            <a:r>
+              <a:rPr lang="en-US" sz="1800" dirty="0" err="1">
+                <a:effectLst/>
+                <a:latin typeface="Calibri" panose="020F0502020204030204" pitchFamily="34" charset="0"/>
+              </a:rPr>
+              <a:t>минимуму</a:t>
+            </a:r>
+            <a:r>
+              <a:rPr lang="en-US" sz="1800" dirty="0">
+                <a:effectLst/>
+                <a:latin typeface="Calibri" panose="020F0502020204030204" pitchFamily="34" charset="0"/>
+              </a:rPr>
+              <a:t> и </a:t>
+            </a:r>
+            <a:r>
+              <a:rPr lang="en-US" sz="1800" dirty="0" err="1">
+                <a:effectLst/>
+                <a:latin typeface="Calibri" panose="020F0502020204030204" pitchFamily="34" charset="0"/>
+              </a:rPr>
+              <a:t>не</a:t>
+            </a:r>
+            <a:r>
+              <a:rPr lang="en-US" sz="1800" dirty="0">
+                <a:effectLst/>
+                <a:latin typeface="Calibri" panose="020F0502020204030204" pitchFamily="34" charset="0"/>
+              </a:rPr>
+              <a:t> </a:t>
+            </a:r>
+            <a:r>
+              <a:rPr lang="en-US" sz="1800" dirty="0" err="1">
+                <a:effectLst/>
+                <a:latin typeface="Calibri" panose="020F0502020204030204" pitchFamily="34" charset="0"/>
+              </a:rPr>
+              <a:t>объедаться</a:t>
+            </a:r>
+            <a:r>
+              <a:rPr lang="ru-RU" sz="1800" dirty="0">
+                <a:effectLst/>
+                <a:latin typeface="Calibri" panose="020F0502020204030204" pitchFamily="34" charset="0"/>
+              </a:rPr>
+              <a:t> они делают все на оборот</a:t>
+            </a:r>
+          </a:p>
+          <a:p>
+            <a:endParaRPr lang="ru-RU" dirty="0"/>
+          </a:p>
+          <a:p>
+            <a:r>
               <a:rPr lang="ru-RU" dirty="0"/>
-              <a:t>Но что если убрать награду с поля видения – подальше.</a:t>
+              <a:t>Вина, стыд, безнадежность, потеря контроля и тп.</a:t>
             </a:r>
           </a:p>
           <a:p>
@@ -4760,8 +5042,21 @@
           </a:p>
           <a:p>
             <a:r>
+              <a:rPr lang="ru-RU" sz="1800" b="1" dirty="0">
+                <a:effectLst/>
+                <a:latin typeface="Calibri" panose="020F0502020204030204" pitchFamily="34" charset="0"/>
+              </a:rPr>
+              <a:t>Поразительно, но именно прощение, а не вина повышает ответственность. </a:t>
+            </a:r>
+            <a:endParaRPr lang="ru-RU" dirty="0"/>
+          </a:p>
+          <a:p>
+            <a:endParaRPr lang="ru-RU" dirty="0"/>
+          </a:p>
+          <a:p>
+            <a:r>
               <a:rPr lang="ru-RU" dirty="0"/>
-              <a:t>Каков у ваш процент скидки? Людям свойственно обесценивать будущие блага.</a:t>
+              <a:t>Когда мы проигрываем в волевых испытаниях, мы часто виним себя: мы слабые, безвольные тюфяки. Но зачастую проблема в том что наш мозг и тело пребывают в неподходящем для самоконтроля состоянии.</a:t>
             </a:r>
           </a:p>
           <a:p>
@@ -4770,16 +5065,35 @@
           <a:p>
             <a:r>
               <a:rPr lang="ru-RU" dirty="0"/>
-              <a:t>Зефирный тест.</a:t>
-            </a:r>
+              <a:t>Решение: прощение и не корить себя за ошибки, а признать что ты всего лишь человек и не идеален.</a:t>
+            </a:r>
+          </a:p>
+          <a:p>
+            <a:endParaRPr lang="ru-RU" dirty="0"/>
+          </a:p>
+          <a:p>
+            <a:r>
+              <a:rPr lang="ru-RU" dirty="0"/>
+              <a:t>Но мы часто думаем что мы сорвались потому что не сильно строги к себе, жестки. Занимаемся самоедством.</a:t>
+            </a:r>
+          </a:p>
+          <a:p>
+            <a:endParaRPr lang="ru-RU" dirty="0"/>
+          </a:p>
+          <a:p>
+            <a:r>
+              <a:rPr lang="ru-RU" dirty="0"/>
+              <a:t>Прощай себя когда ошибаешся.</a:t>
+            </a:r>
+          </a:p>
+          <a:p>
+            <a:endParaRPr lang="ru-RU" dirty="0"/>
           </a:p>
           <a:p>
             <a:r>
               <a:rPr lang="ru-RU" dirty="0"/>
               <a:t> </a:t>
             </a:r>
-          </a:p>
-          <a:p>
             <a:endParaRPr lang="en-US" dirty="0"/>
           </a:p>
         </p:txBody>
@@ -4866,37 +5180,99 @@
           <a:p>
             <a:r>
               <a:rPr lang="ru-RU" dirty="0"/>
-              <a:t>1519 год Эрнан Кортес испанский конкистадор в поисках золота и серебра повел экспедицию с Кубы на полуостров Юкатан в юго-восточной Мексике.</a:t>
+              <a:t>19 шимпанзе или 40 студентов Гарворда.</a:t>
+            </a:r>
+          </a:p>
+          <a:p>
+            <a:r>
+              <a:rPr lang="ru-RU" dirty="0"/>
+              <a:t>2 сейчас или 6 потом. Теория и Реальность.</a:t>
+            </a:r>
+          </a:p>
+          <a:p>
+            <a:endParaRPr lang="ru-RU" dirty="0"/>
+          </a:p>
+          <a:p>
+            <a:r>
+              <a:rPr lang="ru-RU" dirty="0"/>
+              <a:t>Проблема рациональности.</a:t>
+            </a:r>
+          </a:p>
+          <a:p>
+            <a:endParaRPr lang="ru-RU" dirty="0"/>
+          </a:p>
+          <a:p>
+            <a:r>
+              <a:rPr lang="ru-RU" dirty="0"/>
+              <a:t>Экономисты. Обесценивание при задержке.</a:t>
+            </a:r>
+          </a:p>
+          <a:p>
+            <a:endParaRPr lang="ru-RU" dirty="0"/>
+          </a:p>
+          <a:p>
+            <a:r>
+              <a:rPr lang="ru-RU" sz="1800" b="1" dirty="0">
+                <a:effectLst/>
+                <a:latin typeface="Calibri" panose="020F0502020204030204" pitchFamily="34" charset="0"/>
+              </a:rPr>
+              <a:t>Экономисты называют это обесцениванием при задержке — чем дольше приходится ждать награды, тем меньше она ценится.</a:t>
+            </a:r>
+            <a:endParaRPr lang="ru-RU" dirty="0"/>
+          </a:p>
+          <a:p>
+            <a:endParaRPr lang="ru-RU" dirty="0"/>
+          </a:p>
+          <a:p>
+            <a:r>
+              <a:rPr lang="ru-RU" sz="1800" b="1" dirty="0">
+                <a:effectLst/>
+                <a:latin typeface="Calibri" panose="020F0502020204030204" pitchFamily="34" charset="0"/>
+              </a:rPr>
+              <a:t>В поведенческой экономике это называется ограниченной рациональностью: мы рациональны, пока не приходится действовать.</a:t>
+            </a:r>
+            <a:endParaRPr lang="ru-RU" dirty="0"/>
+          </a:p>
+          <a:p>
+            <a:endParaRPr lang="ru-RU" dirty="0"/>
+          </a:p>
+          <a:p>
+            <a:r>
+              <a:rPr lang="ru-RU" dirty="0"/>
+              <a:t>Наша система подкрепления не умеет реагировать на будущие блага.</a:t>
+            </a:r>
+          </a:p>
+          <a:p>
+            <a:endParaRPr lang="ru-RU" dirty="0"/>
+          </a:p>
+          <a:p>
+            <a:r>
+              <a:rPr lang="ru-RU" dirty="0"/>
+              <a:t>Но что если убрать награду с поля видения – подальше.</a:t>
+            </a:r>
+          </a:p>
+          <a:p>
+            <a:endParaRPr lang="ru-RU" dirty="0"/>
+          </a:p>
+          <a:p>
+            <a:r>
+              <a:rPr lang="ru-RU" dirty="0"/>
+              <a:t>Каков у ваш процент скидки? Людям свойственно обесценивать будущие блага.</a:t>
+            </a:r>
+          </a:p>
+          <a:p>
+            <a:endParaRPr lang="ru-RU" dirty="0"/>
+          </a:p>
+          <a:p>
+            <a:r>
+              <a:rPr lang="ru-RU" dirty="0"/>
+              <a:t>Зефирный тест.</a:t>
             </a:r>
           </a:p>
           <a:p>
             <a:r>
               <a:rPr lang="ru-RU" dirty="0"/>
               <a:t> </a:t>
-            </a:r>
-          </a:p>
-          <a:p>
-            <a:r>
-              <a:rPr lang="ru-RU" dirty="0"/>
-              <a:t>Это любимая байка поведенческих экономистов.</a:t>
-            </a:r>
-          </a:p>
-          <a:p>
-            <a:endParaRPr lang="ru-RU" dirty="0"/>
-          </a:p>
-          <a:p>
-            <a:r>
-              <a:rPr lang="ru-RU" dirty="0"/>
-              <a:t>Сайты по блокировке. И даже по оплате если поситишь.</a:t>
-            </a:r>
-          </a:p>
-          <a:p>
-            <a:endParaRPr lang="ru-RU" dirty="0"/>
-          </a:p>
-          <a:p>
-            <a:r>
-              <a:rPr lang="ru-RU" dirty="0"/>
-              <a:t>Будущее я. Будущее я – незнакомец.</a:t>
             </a:r>
           </a:p>
           <a:p>
@@ -4984,27 +5360,69 @@
           <a:bodyPr/>
           <a:lstStyle/>
           <a:p>
+            <a:r>
+              <a:rPr lang="ru-RU" dirty="0"/>
+              <a:t>1519 год Эрнан Кортес испанский конкистадор в поисках золота и серебра повел экспедицию с Кубы на полуостров Юкатан в юго-восточной Мексике.</a:t>
+            </a:r>
+          </a:p>
+          <a:p>
+            <a:r>
+              <a:rPr lang="ru-RU" dirty="0"/>
+              <a:t> </a:t>
+            </a:r>
+          </a:p>
+          <a:p>
+            <a:r>
+              <a:rPr lang="ru-RU" sz="1800" b="1" dirty="0">
+                <a:effectLst/>
+                <a:latin typeface="Calibri" panose="020F0502020204030204" pitchFamily="34" charset="0"/>
+              </a:rPr>
+              <a:t>любимая байка поведенческих экономистов: они считают, что лучшая стратегия самоконтроля — сжигать за собой мосты.</a:t>
+            </a:r>
+          </a:p>
+          <a:p>
             <a:endParaRPr lang="ru-RU" dirty="0"/>
           </a:p>
           <a:p>
+            <a:r>
+              <a:rPr lang="ru-RU" dirty="0"/>
+              <a:t>Сайты по блокировке. И даже по оплате если поситишь.</a:t>
+            </a:r>
+          </a:p>
+          <a:p>
             <a:endParaRPr lang="ru-RU" dirty="0"/>
           </a:p>
           <a:p>
+            <a:r>
+              <a:rPr lang="ru-RU" dirty="0"/>
+              <a:t>Будущее я. Будущее я – незнакомец.</a:t>
+            </a:r>
+          </a:p>
+          <a:p>
             <a:endParaRPr lang="ru-RU" dirty="0"/>
           </a:p>
           <a:p>
             <a:r>
-              <a:rPr lang="ru-RU" dirty="0"/>
-              <a:t>Социальное доказательство.</a:t>
-            </a:r>
-          </a:p>
-          <a:p>
-            <a:endParaRPr lang="ru-RU" dirty="0"/>
-          </a:p>
-          <a:p>
-            <a:r>
-              <a:rPr lang="ru-RU" dirty="0"/>
-              <a:t>Гордость и Стыд.</a:t>
+              <a:rPr lang="ru-RU" sz="1800" dirty="0">
+                <a:effectLst/>
+                <a:latin typeface="Calibri" panose="020F0502020204030204" pitchFamily="34" charset="0"/>
+              </a:rPr>
+              <a:t>Напротив, связь с будущим «я» защищает нас от наших худших порывов.</a:t>
+            </a:r>
+          </a:p>
+          <a:p>
+            <a:endParaRPr lang="ru-RU" sz="1800" dirty="0">
+              <a:effectLst/>
+              <a:latin typeface="Calibri" panose="020F0502020204030204" pitchFamily="34" charset="0"/>
+            </a:endParaRPr>
+          </a:p>
+          <a:p>
+            <a:r>
+              <a:rPr lang="ru-RU" sz="1800" dirty="0">
+                <a:effectLst/>
+                <a:latin typeface="Calibri" panose="020F0502020204030204" pitchFamily="34" charset="0"/>
+              </a:rPr>
+              <a:t>фильм "назад в будущее"</a:t>
             </a:r>
             <a:endParaRPr lang="en-US" dirty="0"/>
           </a:p>
@@ -5090,9 +5508,108 @@
           <a:bodyPr/>
           <a:lstStyle/>
           <a:p>
+            <a:endParaRPr lang="ru-RU" dirty="0"/>
+          </a:p>
+          <a:p>
+            <a:r>
+              <a:rPr lang="ru-RU" sz="1800" b="1" dirty="0">
+                <a:effectLst/>
+                <a:latin typeface="Calibri" panose="020F0502020204030204" pitchFamily="34" charset="0"/>
+              </a:rPr>
+              <a:t>У нас есть особые нейроны — они называются зеркальными, их единственная задача[38] — отслеживать, что думают, чувствуют и делают другие люди.</a:t>
+            </a:r>
+            <a:endParaRPr lang="ru-RU" dirty="0"/>
+          </a:p>
+          <a:p>
+            <a:endParaRPr lang="ru-RU" dirty="0"/>
+          </a:p>
+          <a:p>
+            <a:r>
+              <a:rPr lang="ru-RU" sz="1800" b="1" dirty="0">
+                <a:effectLst/>
+                <a:latin typeface="Calibri" panose="020F0502020204030204" pitchFamily="34" charset="0"/>
+              </a:rPr>
+              <a:t>поэтому продавцов, менеджеров и политиков учат намеренно копировать позы других людей: человек, которому подражают, более внушаем</a:t>
+            </a:r>
+            <a:r>
+              <a:rPr lang="ru-RU" sz="1800" dirty="0">
+                <a:effectLst/>
+                <a:latin typeface="Calibri" panose="020F0502020204030204" pitchFamily="34" charset="0"/>
+              </a:rPr>
+              <a:t>).</a:t>
+            </a:r>
+            <a:endParaRPr lang="ru-RU" dirty="0"/>
+          </a:p>
+          <a:p>
+            <a:endParaRPr lang="ru-RU" dirty="0"/>
+          </a:p>
+          <a:p>
+            <a:r>
+              <a:rPr lang="ru-RU" sz="1800" b="1" dirty="0">
+                <a:effectLst/>
+                <a:latin typeface="Calibri" panose="020F0502020204030204" pitchFamily="34" charset="0"/>
+              </a:rPr>
+              <a:t>закадровый смех</a:t>
+            </a:r>
+            <a:endParaRPr lang="ru-RU" dirty="0"/>
+          </a:p>
+          <a:p>
+            <a:endParaRPr lang="ru-RU" dirty="0"/>
+          </a:p>
+          <a:p>
+            <a:pPr marL="0" marR="0" lvl="0" indent="0" algn="l" defTabSz="914400" rtl="0" eaLnBrk="1" fontAlgn="auto" latinLnBrk="0" hangingPunct="1">
+              <a:lnSpc>
+                <a:spcPct val="100000"/>
+              </a:lnSpc>
+              <a:spcBef>
+                <a:spcPts val="0"/>
+              </a:spcBef>
+              <a:spcAft>
+                <a:spcPts val="0"/>
+              </a:spcAft>
+              <a:buClrTx/>
+              <a:buSzTx/>
+              <a:buFontTx/>
+              <a:buNone/>
+              <a:tabLst/>
+              <a:defRPr/>
+            </a:pPr>
+            <a:r>
+              <a:rPr lang="ru-RU" sz="1800" dirty="0">
+                <a:effectLst/>
+                <a:latin typeface="Calibri" panose="020F0502020204030204" pitchFamily="34" charset="0"/>
+              </a:rPr>
+              <a:t>Поэтому в компании мы едим больше, чем в одиночку, игроки поднимают ставки, когда кто-то срывает куш, и мы тратим больше, когда ходим по магазинам с друзьями.</a:t>
+            </a:r>
+            <a:endParaRPr lang="ru-RU" dirty="0"/>
+          </a:p>
+          <a:p>
+            <a:endParaRPr lang="ru-RU" dirty="0"/>
+          </a:p>
+          <a:p>
+            <a:r>
+              <a:rPr lang="ru-RU" sz="1800" dirty="0">
+                <a:effectLst/>
+                <a:latin typeface="Calibri" panose="020F0502020204030204" pitchFamily="34" charset="0"/>
+              </a:rPr>
+              <a:t>Хорошая новость заключается в том, что </a:t>
+            </a:r>
+            <a:r>
+              <a:rPr lang="ru-RU" sz="1800" b="1" dirty="0">
+                <a:effectLst/>
+                <a:latin typeface="Calibri" panose="020F0502020204030204" pitchFamily="34" charset="0"/>
+              </a:rPr>
+              <a:t>заразиться можно только теми целями, которые вы в некоторой степени разделяете. </a:t>
+            </a:r>
+            <a:endParaRPr lang="ru-RU" dirty="0"/>
+          </a:p>
+          <a:p>
+            <a:endParaRPr lang="ru-RU" dirty="0"/>
+          </a:p>
+          <a:p>
             <a:r>
               <a:rPr lang="ru-RU" dirty="0"/>
-              <a:t>Попытки контролироват мысли и чувства вызывают обратный эффект.</a:t>
+              <a:t>Социальное доказательство.</a:t>
             </a:r>
           </a:p>
           <a:p>
@@ -5100,21 +5617,69 @@
           </a:p>
           <a:p>
             <a:r>
+              <a:rPr lang="ru-RU" sz="1800" dirty="0">
+                <a:effectLst/>
+                <a:latin typeface="Calibri" panose="020F0502020204030204" pitchFamily="34" charset="0"/>
+              </a:rPr>
+              <a:t>Е</a:t>
+            </a:r>
+            <a:r>
+              <a:rPr lang="ru-RU" sz="1800" b="1" dirty="0">
+                <a:effectLst/>
+                <a:latin typeface="Calibri" panose="020F0502020204030204" pitchFamily="34" charset="0"/>
+              </a:rPr>
+              <a:t>сли твои друзья побегут прыгать с моста, ты тоже прыгнешь</a:t>
+            </a:r>
+            <a:r>
+              <a:rPr lang="ru-RU" sz="1800" dirty="0">
+                <a:effectLst/>
+                <a:latin typeface="Calibri" panose="020F0502020204030204" pitchFamily="34" charset="0"/>
+              </a:rPr>
+              <a:t>?</a:t>
+            </a:r>
+            <a:endParaRPr lang="ru-RU" dirty="0"/>
+          </a:p>
+          <a:p>
+            <a:endParaRPr lang="ru-RU" dirty="0"/>
+          </a:p>
+          <a:p>
+            <a:r>
               <a:rPr lang="ru-RU" dirty="0"/>
-              <a:t>Белые медведи.</a:t>
+              <a:t>Гордость и Стыд.</a:t>
             </a:r>
           </a:p>
           <a:p>
             <a:endParaRPr lang="ru-RU" dirty="0"/>
           </a:p>
           <a:p>
-            <a:r>
-              <a:rPr lang="ru-RU" dirty="0"/>
-              <a:t>Проблема с запретами.</a:t>
-            </a:r>
-          </a:p>
-          <a:p>
-            <a:endParaRPr lang="ru-RU" dirty="0"/>
+            <a:pPr marL="0" marR="0" lvl="0" indent="0" algn="l" defTabSz="914400" rtl="0" eaLnBrk="1" fontAlgn="auto" latinLnBrk="0" hangingPunct="1">
+              <a:lnSpc>
+                <a:spcPct val="100000"/>
+              </a:lnSpc>
+              <a:spcBef>
+                <a:spcPts val="0"/>
+              </a:spcBef>
+              <a:spcAft>
+                <a:spcPts val="0"/>
+              </a:spcAft>
+              <a:buClrTx/>
+              <a:buSzTx/>
+              <a:buFontTx/>
+              <a:buNone/>
+              <a:tabLst/>
+              <a:defRPr/>
+            </a:pPr>
+            <a:r>
+              <a:rPr lang="ru-RU" sz="1800" b="1" dirty="0">
+                <a:effectLst/>
+                <a:latin typeface="Calibri" panose="020F0502020204030204" pitchFamily="34" charset="0"/>
+              </a:rPr>
+              <a:t>Дэвид Дестено, психолог из Северо-Восточного университета, утверждает, что такие социальные эмоции, как гордость и стыд, влияют на наши решения быстрее и сильнее рациональных доводов о долгосрочных затратах и выгодах.</a:t>
+            </a:r>
+            <a:endParaRPr lang="ru-RU" sz="1800" dirty="0">
+              <a:effectLst/>
+              <a:latin typeface="Calibri" panose="020F0502020204030204" pitchFamily="34" charset="0"/>
+            </a:endParaRPr>
           </a:p>
           <a:p>
             <a:endParaRPr lang="en-US" dirty="0"/>
@@ -5139,6 +5704,134 @@
             <a:fld id="{EF83ECF8-EBB3-462A-BC97-8AC574C482EA}" type="slidenum">
               <a:rPr lang="en-US" smtClean="0"/>
               <a:t>38</a:t>
+            </a:fld>
+            <a:endParaRPr lang="en-US"/>
+          </a:p>
+        </p:txBody>
+      </p:sp>
+    </p:spTree>
+    <p:extLst>
+      <p:ext uri="{BB962C8B-B14F-4D97-AF65-F5344CB8AC3E}">
+        <p14:creationId xmlns:p14="http://schemas.microsoft.com/office/powerpoint/2010/main" val="2603442122"/>
+      </p:ext>
+    </p:extLst>
+  </p:cSld>
+  <p:clrMapOvr>
+    <a:masterClrMapping/>
+  </p:clrMapOvr>
+</p:notes>
+</file>
+
+<file path=ppt/notesSlides/notesSlide26.xml><?xml version="1.0" encoding="utf-8"?>
+<p:notes xmlns:a="http://schemas.openxmlformats.org/drawingml/2006/main" xmlns:r="http://schemas.openxmlformats.org/officeDocument/2006/relationships" xmlns:p="http://schemas.openxmlformats.org/presentationml/2006/main">
+  <p:cSld>
+    <p:spTree>
+      <p:nvGrpSpPr>
+        <p:cNvPr id="1" name=""/>
+        <p:cNvGrpSpPr/>
+        <p:nvPr/>
+      </p:nvGrpSpPr>
+      <p:grpSpPr>
+        <a:xfrm>
+          <a:off x="0" y="0"/>
+          <a:ext cx="0" cy="0"/>
+          <a:chOff x="0" y="0"/>
+          <a:chExt cx="0" cy="0"/>
+        </a:xfrm>
+      </p:grpSpPr>
+      <p:sp>
+        <p:nvSpPr>
+          <p:cNvPr id="2" name="Slide Image Placeholder 1"/>
+          <p:cNvSpPr>
+            <a:spLocks noGrp="1" noRot="1" noChangeAspect="1"/>
+          </p:cNvSpPr>
+          <p:nvPr>
+            <p:ph type="sldImg"/>
+          </p:nvPr>
+        </p:nvSpPr>
+        <p:spPr/>
+      </p:sp>
+      <p:sp>
+        <p:nvSpPr>
+          <p:cNvPr id="3" name="Notes Placeholder 2"/>
+          <p:cNvSpPr>
+            <a:spLocks noGrp="1"/>
+          </p:cNvSpPr>
+          <p:nvPr>
+            <p:ph type="body" idx="1"/>
+          </p:nvPr>
+        </p:nvSpPr>
+        <p:spPr/>
+        <p:txBody>
+          <a:bodyPr/>
+          <a:lstStyle/>
+          <a:p>
+            <a:r>
+              <a:rPr lang="ru-RU" dirty="0"/>
+              <a:t>Попытки контролироват мысли и чувства вызывают обратный эффект.</a:t>
+            </a:r>
+          </a:p>
+          <a:p>
+            <a:endParaRPr lang="ru-RU" dirty="0"/>
+          </a:p>
+          <a:p>
+            <a:r>
+              <a:rPr lang="ru-RU" dirty="0"/>
+              <a:t>Белые медведи.</a:t>
+            </a:r>
+          </a:p>
+          <a:p>
+            <a:endParaRPr lang="ru-RU" dirty="0"/>
+          </a:p>
+          <a:p>
+            <a:r>
+              <a:rPr lang="ru-RU" dirty="0"/>
+              <a:t>Проблема с запретами.</a:t>
+            </a:r>
+          </a:p>
+          <a:p>
+            <a:endParaRPr lang="ru-RU" dirty="0"/>
+          </a:p>
+          <a:p>
+            <a:r>
+              <a:rPr lang="ru-RU" sz="1800" b="1" dirty="0">
+                <a:effectLst/>
+                <a:latin typeface="Calibri" panose="020F0502020204030204" pitchFamily="34" charset="0"/>
+              </a:rPr>
+              <a:t>Собственно, диеты — даже лучший способ поправиться, чем похудеть. На диетах полнеют сильнее, чем без диет.</a:t>
+            </a:r>
+            <a:endParaRPr lang="ru-RU" dirty="0"/>
+          </a:p>
+          <a:p>
+            <a:r>
+              <a:rPr lang="ru-RU" sz="1800" dirty="0">
+                <a:effectLst/>
+                <a:latin typeface="Calibri" panose="020F0502020204030204" pitchFamily="34" charset="0"/>
+              </a:rPr>
+              <a:t>Чем больше вы избегаете какого-то продукта, тем больше о нем думаете</a:t>
+            </a:r>
+            <a:endParaRPr lang="en-US" dirty="0"/>
+          </a:p>
+        </p:txBody>
+      </p:sp>
+      <p:sp>
+        <p:nvSpPr>
+          <p:cNvPr id="4" name="Slide Number Placeholder 3"/>
+          <p:cNvSpPr>
+            <a:spLocks noGrp="1"/>
+          </p:cNvSpPr>
+          <p:nvPr>
+            <p:ph type="sldNum" sz="quarter" idx="5"/>
+          </p:nvPr>
+        </p:nvSpPr>
+        <p:spPr/>
+        <p:txBody>
+          <a:bodyPr/>
+          <a:lstStyle/>
+          <a:p>
+            <a:fld id="{EF83ECF8-EBB3-462A-BC97-8AC574C482EA}" type="slidenum">
+              <a:rPr lang="en-US" smtClean="0"/>
+              <a:t>39</a:t>
             </a:fld>
             <a:endParaRPr lang="en-US"/>
           </a:p>
@@ -6639,7 +7332,7 @@
             <a:fld id="{1E700B27-DE4C-4B9E-BB11-B9027034A00F}" type="datetimeFigureOut">
               <a:rPr lang="en-US" dirty="0"/>
               <a:pPr/>
-              <a:t>2/4/2021</a:t>
+              <a:t>2/5/2021</a:t>
             </a:fld>
             <a:endParaRPr lang="en-US" dirty="0"/>
           </a:p>
@@ -7755,7 +8448,7 @@
           <a:p>
             <a:fld id="{C40F4739-9812-4A9F-890D-2AD6BA5F6EE8}" type="datetimeFigureOut">
               <a:rPr lang="en-US" dirty="0"/>
-              <a:t>2/4/2021</a:t>
+              <a:t>2/5/2021</a:t>
             </a:fld>
             <a:endParaRPr lang="en-US" dirty="0"/>
           </a:p>
@@ -8762,7 +9455,7 @@
           <a:p>
             <a:fld id="{18845AC5-A3F8-44AA-BA8F-596CDCC976D3}" type="datetimeFigureOut">
               <a:rPr lang="en-US" dirty="0"/>
-              <a:t>2/4/2021</a:t>
+              <a:t>2/5/2021</a:t>
             </a:fld>
             <a:endParaRPr lang="en-US" dirty="0"/>
           </a:p>
@@ -9928,7 +10621,7 @@
           <a:p>
             <a:fld id="{C873B183-A821-4095-A363-9EC968635539}" type="datetimeFigureOut">
               <a:rPr lang="en-US" dirty="0"/>
-              <a:t>2/4/2021</a:t>
+              <a:t>2/5/2021</a:t>
             </a:fld>
             <a:endParaRPr lang="en-US" dirty="0"/>
           </a:p>
@@ -10985,7 +11678,7 @@
           <a:p>
             <a:fld id="{174D01B4-0AA5-45E6-B2E6-5FA4078AEBCF}" type="datetimeFigureOut">
               <a:rPr lang="en-US" dirty="0"/>
-              <a:t>2/4/2021</a:t>
+              <a:t>2/5/2021</a:t>
             </a:fld>
             <a:endParaRPr lang="en-US" dirty="0"/>
           </a:p>
@@ -11627,7 +12320,7 @@
           <a:p>
             <a:fld id="{4147335C-0450-40D7-8612-B3203BED4F28}" type="datetimeFigureOut">
               <a:rPr lang="en-US" dirty="0"/>
-              <a:t>2/4/2021</a:t>
+              <a:t>2/5/2021</a:t>
             </a:fld>
             <a:endParaRPr lang="en-US" dirty="0"/>
           </a:p>
@@ -12470,7 +13163,7 @@
           <a:p>
             <a:fld id="{D246A105-2A1C-4284-B4EA-07CF89B1A393}" type="datetimeFigureOut">
               <a:rPr lang="en-US" dirty="0"/>
-              <a:t>2/4/2021</a:t>
+              <a:t>2/5/2021</a:t>
             </a:fld>
             <a:endParaRPr lang="en-US" dirty="0"/>
           </a:p>
@@ -12641,7 +13334,7 @@
           <a:p>
             <a:fld id="{80DBE609-F3F2-45E6-BD6A-E03A8C86C1AE}" type="datetimeFigureOut">
               <a:rPr lang="en-US" dirty="0"/>
-              <a:t>2/4/2021</a:t>
+              <a:t>2/5/2021</a:t>
             </a:fld>
             <a:endParaRPr lang="en-US" dirty="0"/>
           </a:p>
@@ -13635,7 +14328,7 @@
           <a:p>
             <a:fld id="{7A24AD68-089C-4467-A8F3-EA2BBCA6B44E}" type="datetimeFigureOut">
               <a:rPr lang="en-US" dirty="0"/>
-              <a:t>2/4/2021</a:t>
+              <a:t>2/5/2021</a:t>
             </a:fld>
             <a:endParaRPr lang="en-US" dirty="0"/>
           </a:p>
@@ -13837,7 +14530,7 @@
           <a:p>
             <a:fld id="{75C51FCE-E4BB-4680-8E50-3C0E348D2609}" type="datetimeFigureOut">
               <a:rPr lang="en-US" dirty="0"/>
-              <a:t>2/4/2021</a:t>
+              <a:t>2/5/2021</a:t>
             </a:fld>
             <a:endParaRPr lang="en-US" dirty="0"/>
           </a:p>
@@ -14895,7 +15588,7 @@
           <a:p>
             <a:fld id="{8AAA073D-A903-47F8-8D16-77642FB0DF1F}" type="datetimeFigureOut">
               <a:rPr lang="en-US" dirty="0"/>
-              <a:t>2/4/2021</a:t>
+              <a:t>2/5/2021</a:t>
             </a:fld>
             <a:endParaRPr lang="en-US" dirty="0"/>
           </a:p>
@@ -15163,7 +15856,7 @@
           <a:p>
             <a:fld id="{AB91FA40-626B-4CA1-85D0-7A9016E395BA}" type="datetimeFigureOut">
               <a:rPr lang="en-US" dirty="0"/>
-              <a:t>2/4/2021</a:t>
+              <a:t>2/5/2021</a:t>
             </a:fld>
             <a:endParaRPr lang="en-US" dirty="0"/>
           </a:p>
@@ -15541,7 +16234,7 @@
           <a:p>
             <a:fld id="{C3F425EA-B9DC-48A7-991E-9A82573B1B21}" type="datetimeFigureOut">
               <a:rPr lang="en-US" dirty="0"/>
-              <a:t>2/4/2021</a:t>
+              <a:t>2/5/2021</a:t>
             </a:fld>
             <a:endParaRPr lang="en-US" dirty="0"/>
           </a:p>
@@ -15655,7 +16348,7 @@
           <a:p>
             <a:fld id="{66CB97F8-6CEB-469B-AFCC-889F2A2B1D5A}" type="datetimeFigureOut">
               <a:rPr lang="en-US" dirty="0"/>
-              <a:t>2/4/2021</a:t>
+              <a:t>2/5/2021</a:t>
             </a:fld>
             <a:endParaRPr lang="en-US" dirty="0"/>
           </a:p>
@@ -15746,7 +16439,7 @@
           <a:p>
             <a:fld id="{8FA9179F-009E-4FA5-B091-7EBB82A185BD}" type="datetimeFigureOut">
               <a:rPr lang="en-US" dirty="0"/>
-              <a:t>2/4/2021</a:t>
+              <a:t>2/5/2021</a:t>
             </a:fld>
             <a:endParaRPr lang="en-US" dirty="0"/>
           </a:p>
@@ -16851,7 +17544,7 @@
           <a:p>
             <a:fld id="{8E665CEB-0076-4E37-B880-BCEA9784DE0A}" type="datetimeFigureOut">
               <a:rPr lang="en-US" dirty="0"/>
-              <a:t>2/4/2021</a:t>
+              <a:t>2/5/2021</a:t>
             </a:fld>
             <a:endParaRPr lang="en-US" dirty="0"/>
           </a:p>
@@ -17980,7 +18673,7 @@
           <a:p>
             <a:fld id="{A6149E5E-3896-4118-99A7-7B85668F1C5E}" type="datetimeFigureOut">
               <a:rPr lang="en-US" dirty="0"/>
-              <a:t>2/4/2021</a:t>
+              <a:t>2/5/2021</a:t>
             </a:fld>
             <a:endParaRPr lang="en-US" dirty="0"/>
           </a:p>
@@ -19004,7 +19697,7 @@
           <a:p>
             <a:fld id="{7E0D914D-B099-4142-A885-11F276715148}" type="datetimeFigureOut">
               <a:rPr lang="en-US" dirty="0"/>
-              <a:t>2/4/2021</a:t>
+              <a:t>2/5/2021</a:t>
             </a:fld>
             <a:endParaRPr lang="en-US" dirty="0"/>
           </a:p>
@@ -22466,56 +23159,24 @@
         </p:nvSpPr>
         <p:spPr>
           <a:xfrm>
-            <a:off x="1154953" y="2603500"/>
-            <a:ext cx="8761412" cy="3416300"/>
+            <a:off x="1154953" y="3729518"/>
+            <a:ext cx="8761412" cy="2290281"/>
           </a:xfrm>
         </p:spPr>
         <p:txBody>
-          <a:bodyPr/>
+          <a:bodyPr>
+            <a:normAutofit/>
+          </a:bodyPr>
           <a:lstStyle/>
           <a:p>
-            <a:r>
-              <a:rPr lang="ru-RU" dirty="0"/>
-              <a:t>Сила воли это мышца.</a:t>
-            </a:r>
-          </a:p>
-          <a:p>
-            <a:r>
-              <a:rPr lang="ru-RU" dirty="0"/>
-              <a:t>Восполняйте резерв силы воли.</a:t>
-            </a:r>
-          </a:p>
-          <a:p>
-            <a:r>
-              <a:rPr lang="ru-RU" dirty="0"/>
-              <a:t>Границы самоконтроля.</a:t>
-            </a:r>
-          </a:p>
-          <a:p>
-            <a:r>
-              <a:rPr lang="ru-RU" dirty="0"/>
-              <a:t>Эффект нравственной поблажки.</a:t>
-            </a:r>
-          </a:p>
-          <a:p>
-            <a:r>
-              <a:rPr lang="ru-RU" dirty="0"/>
-              <a:t>Система подкрепления </a:t>
-            </a:r>
-            <a:r>
-              <a:rPr lang="en-US" dirty="0"/>
-              <a:t>&lt;&lt;&lt;</a:t>
-            </a:r>
-            <a:endParaRPr lang="ru-RU" dirty="0"/>
-          </a:p>
-          <a:p>
-            <a:endParaRPr lang="ru-RU" dirty="0"/>
-          </a:p>
-          <a:p>
-            <a:endParaRPr lang="ru-RU" dirty="0"/>
-          </a:p>
-          <a:p>
-            <a:endParaRPr lang="en-US" dirty="0"/>
+            <a:pPr marL="0" indent="0" algn="ctr">
+              <a:buNone/>
+            </a:pPr>
+            <a:r>
+              <a:rPr lang="ru-RU" sz="2000" b="1" dirty="0"/>
+              <a:t>Часть вторая</a:t>
+            </a:r>
+            <a:endParaRPr lang="en-US" sz="2000" b="1" dirty="0"/>
           </a:p>
         </p:txBody>
       </p:sp>
@@ -22624,19 +23285,13 @@
           <a:p>
             <a:r>
               <a:rPr lang="ru-RU" dirty="0"/>
-              <a:t>Эффект нравственной поблажки</a:t>
+              <a:t>Эффект нравственной поблажки.</a:t>
             </a:r>
           </a:p>
           <a:p>
             <a:r>
               <a:rPr lang="ru-RU" dirty="0"/>
-              <a:t>Система подкрепления.</a:t>
-            </a:r>
-          </a:p>
-          <a:p>
-            <a:r>
-              <a:rPr lang="ru-RU" dirty="0"/>
-              <a:t>Эффект «какого черта» </a:t>
+              <a:t>Система подкрепления </a:t>
             </a:r>
             <a:r>
               <a:rPr lang="en-US" dirty="0"/>
@@ -22658,7 +23313,7 @@
     </p:spTree>
     <p:extLst>
       <p:ext uri="{BB962C8B-B14F-4D97-AF65-F5344CB8AC3E}">
-        <p14:creationId xmlns:p14="http://schemas.microsoft.com/office/powerpoint/2010/main" val="2657785371"/>
+        <p14:creationId xmlns:p14="http://schemas.microsoft.com/office/powerpoint/2010/main" val="1775588817"/>
       </p:ext>
     </p:extLst>
   </p:cSld>
@@ -22772,21 +23427,20 @@
           <a:p>
             <a:r>
               <a:rPr lang="ru-RU" dirty="0"/>
-              <a:t>Эффект «какого черта».</a:t>
-            </a:r>
-          </a:p>
-          <a:p>
+              <a:t>Эффект «</a:t>
+            </a:r>
+            <a:r>
+              <a:rPr lang="ru-RU" i="1" dirty="0"/>
+              <a:t>какого черта</a:t>
+            </a:r>
             <a:r>
               <a:rPr lang="ru-RU" dirty="0"/>
-              <a:t>Будущее на продажу </a:t>
+              <a:t>» </a:t>
             </a:r>
             <a:r>
               <a:rPr lang="en-US" dirty="0"/>
               <a:t>&lt;&lt;&lt;</a:t>
             </a:r>
-            <a:endParaRPr lang="ru-RU" dirty="0"/>
-          </a:p>
-          <a:p>
             <a:endParaRPr lang="ru-RU" dirty="0"/>
           </a:p>
           <a:p>
@@ -22803,7 +23457,7 @@
     </p:spTree>
     <p:extLst>
       <p:ext uri="{BB962C8B-B14F-4D97-AF65-F5344CB8AC3E}">
-        <p14:creationId xmlns:p14="http://schemas.microsoft.com/office/powerpoint/2010/main" val="2488269123"/>
+        <p14:creationId xmlns:p14="http://schemas.microsoft.com/office/powerpoint/2010/main" val="2657785371"/>
       </p:ext>
     </p:extLst>
   </p:cSld>
@@ -22882,9 +23536,7 @@
           </a:xfrm>
         </p:spPr>
         <p:txBody>
-          <a:bodyPr>
-            <a:normAutofit/>
-          </a:bodyPr>
+          <a:bodyPr/>
           <a:lstStyle/>
           <a:p>
             <a:r>
@@ -22919,24 +23571,29 @@
           <a:p>
             <a:r>
               <a:rPr lang="ru-RU" dirty="0"/>
-              <a:t>Эффект «какого черта».</a:t>
-            </a:r>
-          </a:p>
-          <a:p>
+              <a:t>Эффект «</a:t>
+            </a:r>
+            <a:r>
+              <a:rPr lang="ru-RU" i="1" dirty="0"/>
+              <a:t>какого черта</a:t>
+            </a:r>
             <a:r>
               <a:rPr lang="ru-RU" dirty="0"/>
-              <a:t>Будущее на продажу.</a:t>
+              <a:t>».</a:t>
             </a:r>
           </a:p>
           <a:p>
             <a:r>
               <a:rPr lang="ru-RU" dirty="0"/>
-              <a:t>Сжигайте мосты </a:t>
+              <a:t>Будущее на продажу </a:t>
             </a:r>
             <a:r>
               <a:rPr lang="en-US" dirty="0"/>
               <a:t>&lt;&lt;&lt;</a:t>
             </a:r>
+            <a:endParaRPr lang="ru-RU" dirty="0"/>
+          </a:p>
+          <a:p>
             <a:endParaRPr lang="ru-RU" dirty="0"/>
           </a:p>
           <a:p>
@@ -22953,7 +23610,7 @@
     </p:spTree>
     <p:extLst>
       <p:ext uri="{BB962C8B-B14F-4D97-AF65-F5344CB8AC3E}">
-        <p14:creationId xmlns:p14="http://schemas.microsoft.com/office/powerpoint/2010/main" val="645881649"/>
+        <p14:creationId xmlns:p14="http://schemas.microsoft.com/office/powerpoint/2010/main" val="2488269123"/>
       </p:ext>
     </p:extLst>
   </p:cSld>
@@ -23028,7 +23685,7 @@
         <p:spPr>
           <a:xfrm>
             <a:off x="1154953" y="2603500"/>
-            <a:ext cx="8761412" cy="4158544"/>
+            <a:ext cx="8761412" cy="3416300"/>
           </a:xfrm>
         </p:spPr>
         <p:txBody>
@@ -23069,7 +23726,15 @@
           <a:p>
             <a:r>
               <a:rPr lang="ru-RU" dirty="0"/>
-              <a:t>Эффект «какого черта».</a:t>
+              <a:t>Эффект «</a:t>
+            </a:r>
+            <a:r>
+              <a:rPr lang="ru-RU" i="1" dirty="0"/>
+              <a:t>какого черта</a:t>
+            </a:r>
+            <a:r>
+              <a:rPr lang="ru-RU" dirty="0"/>
+              <a:t>».</a:t>
             </a:r>
           </a:p>
           <a:p>
@@ -23081,21 +23746,12 @@
           <a:p>
             <a:r>
               <a:rPr lang="ru-RU" dirty="0"/>
-              <a:t>Сжигайте мосты.</a:t>
-            </a:r>
-          </a:p>
-          <a:p>
-            <a:r>
-              <a:rPr lang="ru-RU" dirty="0"/>
-              <a:t>Зеркальные нейроны </a:t>
+              <a:t>Сжигайте мосты </a:t>
             </a:r>
             <a:r>
               <a:rPr lang="en-US" dirty="0"/>
               <a:t>&lt;&lt;&lt;</a:t>
             </a:r>
-            <a:endParaRPr lang="ru-RU" dirty="0"/>
-          </a:p>
-          <a:p>
             <a:endParaRPr lang="ru-RU" dirty="0"/>
           </a:p>
           <a:p>
@@ -23112,7 +23768,7 @@
     </p:spTree>
     <p:extLst>
       <p:ext uri="{BB962C8B-B14F-4D97-AF65-F5344CB8AC3E}">
-        <p14:creationId xmlns:p14="http://schemas.microsoft.com/office/powerpoint/2010/main" val="1698053080"/>
+        <p14:creationId xmlns:p14="http://schemas.microsoft.com/office/powerpoint/2010/main" val="645881649"/>
       </p:ext>
     </p:extLst>
   </p:cSld>
@@ -23186,12 +23842,14 @@
         </p:nvSpPr>
         <p:spPr>
           <a:xfrm>
-            <a:off x="1154953" y="2603499"/>
-            <a:ext cx="8761412" cy="4135967"/>
+            <a:off x="1154953" y="2603500"/>
+            <a:ext cx="8761412" cy="4158544"/>
           </a:xfrm>
         </p:spPr>
         <p:txBody>
-          <a:bodyPr/>
+          <a:bodyPr>
+            <a:normAutofit/>
+          </a:bodyPr>
           <a:lstStyle/>
           <a:p>
             <a:r>
@@ -23252,13 +23910,7 @@
           <a:p>
             <a:r>
               <a:rPr lang="ru-RU" dirty="0"/>
-              <a:t>Зеркальные нейроны.</a:t>
-            </a:r>
-          </a:p>
-          <a:p>
-            <a:r>
-              <a:rPr lang="ru-RU" dirty="0"/>
-              <a:t>Иронический бумеранг </a:t>
+              <a:t>Зеркальные нейроны </a:t>
             </a:r>
             <a:r>
               <a:rPr lang="en-US" dirty="0"/>
@@ -23283,7 +23935,7 @@
     </p:spTree>
     <p:extLst>
       <p:ext uri="{BB962C8B-B14F-4D97-AF65-F5344CB8AC3E}">
-        <p14:creationId xmlns:p14="http://schemas.microsoft.com/office/powerpoint/2010/main" val="1670453226"/>
+        <p14:creationId xmlns:p14="http://schemas.microsoft.com/office/powerpoint/2010/main" val="1698053080"/>
       </p:ext>
     </p:extLst>
   </p:cSld>
@@ -23333,7 +23985,7 @@
           <a:p>
             <a:r>
               <a:rPr lang="ru-RU" dirty="0"/>
-              <a:t>Резюме книги Келли Макгонигал</a:t>
+              <a:t>Келли Макгонигал</a:t>
             </a:r>
             <a:endParaRPr lang="en-US" dirty="0"/>
           </a:p>
@@ -23355,19 +24007,106 @@
             <p:ph idx="1"/>
           </p:nvPr>
         </p:nvSpPr>
-        <p:spPr/>
+        <p:spPr>
+          <a:xfrm>
+            <a:off x="1154953" y="2603499"/>
+            <a:ext cx="8761412" cy="4135967"/>
+          </a:xfrm>
+        </p:spPr>
         <p:txBody>
           <a:bodyPr/>
           <a:lstStyle/>
           <a:p>
+            <a:r>
+              <a:rPr lang="ru-RU" dirty="0"/>
+              <a:t>Сила воли это мышца.</a:t>
+            </a:r>
+          </a:p>
+          <a:p>
+            <a:r>
+              <a:rPr lang="ru-RU" dirty="0"/>
+              <a:t>Восполняйте резерв силы воли.</a:t>
+            </a:r>
+          </a:p>
+          <a:p>
+            <a:r>
+              <a:rPr lang="ru-RU" dirty="0"/>
+              <a:t>Границы самоконтроля.</a:t>
+            </a:r>
+          </a:p>
+          <a:p>
+            <a:r>
+              <a:rPr lang="ru-RU" dirty="0"/>
+              <a:t>Эффект нравственной поблажки</a:t>
+            </a:r>
+          </a:p>
+          <a:p>
+            <a:r>
+              <a:rPr lang="ru-RU" dirty="0"/>
+              <a:t>Система подкрепления.</a:t>
+            </a:r>
+          </a:p>
+          <a:p>
+            <a:r>
+              <a:rPr lang="ru-RU" dirty="0"/>
+              <a:t>Эффект «</a:t>
+            </a:r>
+            <a:r>
+              <a:rPr lang="ru-RU" i="1" dirty="0"/>
+              <a:t>какого черта</a:t>
+            </a:r>
+            <a:r>
+              <a:rPr lang="ru-RU" dirty="0"/>
+              <a:t>».</a:t>
+            </a:r>
+          </a:p>
+          <a:p>
+            <a:r>
+              <a:rPr lang="ru-RU" dirty="0"/>
+              <a:t>Будущее на продажу.</a:t>
+            </a:r>
+          </a:p>
+          <a:p>
+            <a:r>
+              <a:rPr lang="ru-RU" dirty="0"/>
+              <a:t>Сжигайте мосты.</a:t>
+            </a:r>
+          </a:p>
+          <a:p>
+            <a:r>
+              <a:rPr lang="ru-RU" dirty="0"/>
+              <a:t>Зеркальные нейроны.</a:t>
+            </a:r>
+          </a:p>
+          <a:p>
+            <a:r>
+              <a:rPr lang="ru-RU" dirty="0"/>
+              <a:t>Иронический бумеранг </a:t>
+            </a:r>
+            <a:r>
+              <a:rPr lang="en-US" dirty="0"/>
+              <a:t>&lt;&lt;&lt;</a:t>
+            </a:r>
             <a:endParaRPr lang="ru-RU" dirty="0"/>
+          </a:p>
+          <a:p>
+            <a:endParaRPr lang="ru-RU" dirty="0"/>
+          </a:p>
+          <a:p>
+            <a:endParaRPr lang="ru-RU" dirty="0"/>
+          </a:p>
+          <a:p>
+            <a:endParaRPr lang="ru-RU" dirty="0"/>
+          </a:p>
+          <a:p>
+            <a:endParaRPr lang="en-US" dirty="0"/>
           </a:p>
         </p:txBody>
       </p:sp>
     </p:spTree>
     <p:extLst>
       <p:ext uri="{BB962C8B-B14F-4D97-AF65-F5344CB8AC3E}">
-        <p14:creationId xmlns:p14="http://schemas.microsoft.com/office/powerpoint/2010/main" val="1639902987"/>
+        <p14:creationId xmlns:p14="http://schemas.microsoft.com/office/powerpoint/2010/main" val="1670453226"/>
       </p:ext>
     </p:extLst>
   </p:cSld>
@@ -23529,7 +24268,7 @@
           <a:p>
             <a:r>
               <a:rPr lang="ru-RU" dirty="0"/>
-              <a:t>Бенжамин Харди</a:t>
+              <a:t>Резюме книги Келли Макгонигал</a:t>
             </a:r>
             <a:endParaRPr lang="en-US" dirty="0"/>
           </a:p>
@@ -23553,31 +24292,34 @@
         </p:nvSpPr>
         <p:spPr>
           <a:xfrm>
-            <a:off x="1154954" y="3816990"/>
-            <a:ext cx="9549397" cy="2202809"/>
+            <a:off x="1154955" y="3569464"/>
+            <a:ext cx="8761412" cy="2450335"/>
           </a:xfrm>
         </p:spPr>
         <p:txBody>
-          <a:bodyPr>
-            <a:normAutofit/>
-          </a:bodyPr>
+          <a:bodyPr/>
           <a:lstStyle/>
           <a:p>
             <a:pPr marL="0" indent="0" algn="ctr">
               <a:buNone/>
             </a:pPr>
             <a:r>
-              <a:rPr lang="ru-RU" sz="2000" b="1" dirty="0"/>
-              <a:t>Сила воли не работает. Пусть твое окружение работает вместо нее.</a:t>
-            </a:r>
-            <a:endParaRPr lang="en-US" sz="2000" b="1" dirty="0"/>
+              <a:rPr lang="ru-RU" sz="1800" i="1" dirty="0">
+                <a:effectLst/>
+                <a:latin typeface="Century Gothic (Body)"/>
+              </a:rPr>
+              <a:t>Сохраните мировоззрение ученого. Пробуйте новое, собирайте собственные данные, прислушивайтесь к фактам. Будьте открыты неожиданным идеям, учитесь как на собственных ошибках, так и на успехах. Берегите то, что вам помогает, и делитесь знаниями с окружающими.</a:t>
+            </a:r>
+            <a:endParaRPr lang="ru-RU" i="1" dirty="0">
+              <a:latin typeface="Century Gothic (Body)"/>
+            </a:endParaRPr>
           </a:p>
         </p:txBody>
       </p:sp>
     </p:spTree>
     <p:extLst>
       <p:ext uri="{BB962C8B-B14F-4D97-AF65-F5344CB8AC3E}">
-        <p14:creationId xmlns:p14="http://schemas.microsoft.com/office/powerpoint/2010/main" val="3215833638"/>
+        <p14:creationId xmlns:p14="http://schemas.microsoft.com/office/powerpoint/2010/main" val="1639902987"/>
       </p:ext>
     </p:extLst>
   </p:cSld>
@@ -23627,7 +24369,7 @@
           <a:p>
             <a:r>
               <a:rPr lang="ru-RU" dirty="0"/>
-              <a:t>Бенжамин Харди</a:t>
+              <a:t>Резюме книги Келли Макгонигал</a:t>
             </a:r>
             <a:endParaRPr lang="en-US" dirty="0"/>
           </a:p>
@@ -23654,12 +24396,6 @@
           <a:bodyPr/>
           <a:lstStyle/>
           <a:p>
-            <a:r>
-              <a:rPr lang="ru-RU" dirty="0"/>
-              <a:t>Человек – порождение ситуации.</a:t>
-            </a:r>
-          </a:p>
-          <a:p>
             <a:endParaRPr lang="ru-RU" dirty="0"/>
           </a:p>
         </p:txBody>
@@ -23667,7 +24403,7 @@
     </p:spTree>
     <p:extLst>
       <p:ext uri="{BB962C8B-B14F-4D97-AF65-F5344CB8AC3E}">
-        <p14:creationId xmlns:p14="http://schemas.microsoft.com/office/powerpoint/2010/main" val="1059165568"/>
+        <p14:creationId xmlns:p14="http://schemas.microsoft.com/office/powerpoint/2010/main" val="846126053"/>
       </p:ext>
     </p:extLst>
   </p:cSld>
@@ -23739,31 +24475,33 @@
             <p:ph idx="1"/>
           </p:nvPr>
         </p:nvSpPr>
-        <p:spPr/>
-        <p:txBody>
-          <a:bodyPr/>
+        <p:spPr>
+          <a:xfrm>
+            <a:off x="1154954" y="3816990"/>
+            <a:ext cx="9549397" cy="2202809"/>
+          </a:xfrm>
+        </p:spPr>
+        <p:txBody>
+          <a:bodyPr>
+            <a:normAutofit/>
+          </a:bodyPr>
           <a:lstStyle/>
           <a:p>
-            <a:r>
-              <a:rPr lang="ru-RU" dirty="0"/>
-              <a:t>Человек – порождение ситуации.</a:t>
-            </a:r>
-          </a:p>
-          <a:p>
-            <a:r>
-              <a:rPr lang="ru-RU" dirty="0"/>
-              <a:t>Ваша среда формирует вас.</a:t>
-            </a:r>
-          </a:p>
-          <a:p>
-            <a:endParaRPr lang="ru-RU" dirty="0"/>
+            <a:pPr marL="0" indent="0" algn="ctr">
+              <a:buNone/>
+            </a:pPr>
+            <a:r>
+              <a:rPr lang="ru-RU" sz="2000" b="1" dirty="0"/>
+              <a:t>Сила воли не работает. Пусть твое окружение работает вместо нее.</a:t>
+            </a:r>
+            <a:endParaRPr lang="en-US" sz="2000" b="1" dirty="0"/>
           </a:p>
         </p:txBody>
       </p:sp>
     </p:spTree>
     <p:extLst>
       <p:ext uri="{BB962C8B-B14F-4D97-AF65-F5344CB8AC3E}">
-        <p14:creationId xmlns:p14="http://schemas.microsoft.com/office/powerpoint/2010/main" val="2398533860"/>
+        <p14:creationId xmlns:p14="http://schemas.microsoft.com/office/powerpoint/2010/main" val="3215833638"/>
       </p:ext>
     </p:extLst>
   </p:cSld>
@@ -23813,7 +24551,7 @@
           <a:p>
             <a:r>
               <a:rPr lang="ru-RU" dirty="0"/>
-              <a:t>Резюме по книге Бенжамин Харди</a:t>
+              <a:t>Бенжамин Харди</a:t>
             </a:r>
             <a:endParaRPr lang="en-US" dirty="0"/>
           </a:p>
@@ -23840,6 +24578,12 @@
           <a:bodyPr/>
           <a:lstStyle/>
           <a:p>
+            <a:r>
+              <a:rPr lang="ru-RU" dirty="0"/>
+              <a:t>Человек – порождение ситуации.</a:t>
+            </a:r>
+          </a:p>
+          <a:p>
             <a:endParaRPr lang="ru-RU" dirty="0"/>
           </a:p>
         </p:txBody>
@@ -23847,7 +24591,7 @@
     </p:spTree>
     <p:extLst>
       <p:ext uri="{BB962C8B-B14F-4D97-AF65-F5344CB8AC3E}">
-        <p14:creationId xmlns:p14="http://schemas.microsoft.com/office/powerpoint/2010/main" val="1409395795"/>
+        <p14:creationId xmlns:p14="http://schemas.microsoft.com/office/powerpoint/2010/main" val="1059165568"/>
       </p:ext>
     </p:extLst>
   </p:cSld>
@@ -23897,7 +24641,7 @@
           <a:p>
             <a:r>
               <a:rPr lang="ru-RU" dirty="0"/>
-              <a:t>Так есть ли Сила Воли?</a:t>
+              <a:t>Бенжамин Харди</a:t>
             </a:r>
             <a:endParaRPr lang="en-US" dirty="0"/>
           </a:p>
@@ -23924,6 +24668,18 @@
           <a:bodyPr/>
           <a:lstStyle/>
           <a:p>
+            <a:r>
+              <a:rPr lang="ru-RU" dirty="0"/>
+              <a:t>Человек – порождение ситуации.</a:t>
+            </a:r>
+          </a:p>
+          <a:p>
+            <a:r>
+              <a:rPr lang="ru-RU" dirty="0"/>
+              <a:t>Ваша среда формирует вас.</a:t>
+            </a:r>
+          </a:p>
+          <a:p>
             <a:endParaRPr lang="ru-RU" dirty="0"/>
           </a:p>
         </p:txBody>
@@ -23931,7 +24687,7 @@
     </p:spTree>
     <p:extLst>
       <p:ext uri="{BB962C8B-B14F-4D97-AF65-F5344CB8AC3E}">
-        <p14:creationId xmlns:p14="http://schemas.microsoft.com/office/powerpoint/2010/main" val="2164139279"/>
+        <p14:creationId xmlns:p14="http://schemas.microsoft.com/office/powerpoint/2010/main" val="2398533860"/>
       </p:ext>
     </p:extLst>
   </p:cSld>
@@ -23981,7 +24737,7 @@
           <a:p>
             <a:r>
               <a:rPr lang="ru-RU" dirty="0"/>
-              <a:t>Так есть ли Сила Воли?</a:t>
+              <a:t>Резюме по книге Бенжамин Харди</a:t>
             </a:r>
             <a:endParaRPr lang="en-US" dirty="0"/>
           </a:p>
@@ -24008,25 +24764,14 @@
           <a:bodyPr/>
           <a:lstStyle/>
           <a:p>
-            <a:r>
-              <a:rPr lang="ru-RU" dirty="0"/>
-              <a:t>Если мы под силой воли подразумеваем способность управлять самим собой (самоконтроль/дисциплина) и ходом своей жизни таким образом, что бы добиваться всех намеченных целей и реализовывать практически любые свои желания. – Ответ: </a:t>
-            </a:r>
-            <a:r>
-              <a:rPr lang="ru-RU" sz="2000" b="1" dirty="0"/>
-              <a:t>Да</a:t>
-            </a:r>
-            <a:r>
-              <a:rPr lang="ru-RU" dirty="0"/>
-              <a:t>. </a:t>
-            </a:r>
+            <a:endParaRPr lang="ru-RU" dirty="0"/>
           </a:p>
         </p:txBody>
       </p:sp>
     </p:spTree>
     <p:extLst>
       <p:ext uri="{BB962C8B-B14F-4D97-AF65-F5344CB8AC3E}">
-        <p14:creationId xmlns:p14="http://schemas.microsoft.com/office/powerpoint/2010/main" val="1046140786"/>
+        <p14:creationId xmlns:p14="http://schemas.microsoft.com/office/powerpoint/2010/main" val="1409395795"/>
       </p:ext>
     </p:extLst>
   </p:cSld>
@@ -24100,47 +24845,17 @@
         </p:nvSpPr>
         <p:spPr/>
         <p:txBody>
-          <a:bodyPr>
-            <a:normAutofit/>
-          </a:bodyPr>
+          <a:bodyPr/>
           <a:lstStyle/>
           <a:p>
-            <a:r>
-              <a:rPr lang="ru-RU" dirty="0"/>
-              <a:t>Если мы под силой воли подразумеваем способность управлять самим собой (самоконтроль/дисциплина) и ходом своей жизни таким образом, что бы добиваться всех намеченных целей и реализовывать практически любые свои желания. – Ответ: </a:t>
-            </a:r>
-            <a:r>
-              <a:rPr lang="ru-RU" sz="2000" b="1" dirty="0"/>
-              <a:t>Да</a:t>
-            </a:r>
-            <a:r>
-              <a:rPr lang="ru-RU" dirty="0"/>
-              <a:t>. </a:t>
-            </a:r>
-          </a:p>
-          <a:p>
             <a:endParaRPr lang="ru-RU" dirty="0"/>
-          </a:p>
-          <a:p>
-            <a:r>
-              <a:rPr lang="ru-RU" dirty="0"/>
-              <a:t>Поможет ли нам Сила Воли? – ответ: </a:t>
-            </a:r>
-            <a:r>
-              <a:rPr lang="ru-RU" sz="2000" b="1" dirty="0"/>
-              <a:t>Нет</a:t>
-            </a:r>
-            <a:r>
-              <a:rPr lang="ru-RU" b="1" dirty="0"/>
-              <a:t>.</a:t>
-            </a:r>
           </a:p>
         </p:txBody>
       </p:sp>
     </p:spTree>
     <p:extLst>
       <p:ext uri="{BB962C8B-B14F-4D97-AF65-F5344CB8AC3E}">
-        <p14:creationId xmlns:p14="http://schemas.microsoft.com/office/powerpoint/2010/main" val="3424737229"/>
+        <p14:creationId xmlns:p14="http://schemas.microsoft.com/office/powerpoint/2010/main" val="2164139279"/>
       </p:ext>
     </p:extLst>
   </p:cSld>
@@ -24190,7 +24905,7 @@
           <a:p>
             <a:r>
               <a:rPr lang="ru-RU" dirty="0"/>
-              <a:t>И что мне делать?</a:t>
+              <a:t>Так есть ли Сила Воли?</a:t>
             </a:r>
             <a:endParaRPr lang="en-US" dirty="0"/>
           </a:p>
@@ -24212,24 +24927,30 @@
             <p:ph idx="1"/>
           </p:nvPr>
         </p:nvSpPr>
-        <p:spPr>
-          <a:xfrm>
-            <a:off x="1154955" y="2603500"/>
-            <a:ext cx="10077904" cy="3416300"/>
-          </a:xfrm>
-        </p:spPr>
+        <p:spPr/>
         <p:txBody>
           <a:bodyPr/>
           <a:lstStyle/>
           <a:p>
-            <a:endParaRPr lang="ru-RU" dirty="0"/>
+            <a:r>
+              <a:rPr lang="ru-RU" dirty="0"/>
+              <a:t>Если мы под силой воли подразумеваем способность управлять самим собой (самоконтроль/дисциплина) и ходом своей жизни таким образом, что бы добиваться всех намеченных целей и реализовывать практически любые свои желания. – Ответ: </a:t>
+            </a:r>
+            <a:r>
+              <a:rPr lang="ru-RU" sz="2000" b="1" dirty="0"/>
+              <a:t>Да</a:t>
+            </a:r>
+            <a:r>
+              <a:rPr lang="ru-RU" dirty="0"/>
+              <a:t>. </a:t>
+            </a:r>
           </a:p>
         </p:txBody>
       </p:sp>
     </p:spTree>
     <p:extLst>
       <p:ext uri="{BB962C8B-B14F-4D97-AF65-F5344CB8AC3E}">
-        <p14:creationId xmlns:p14="http://schemas.microsoft.com/office/powerpoint/2010/main" val="104215905"/>
+        <p14:creationId xmlns:p14="http://schemas.microsoft.com/office/powerpoint/2010/main" val="1046140786"/>
       </p:ext>
     </p:extLst>
   </p:cSld>
@@ -24279,7 +25000,7 @@
           <a:p>
             <a:r>
               <a:rPr lang="ru-RU" dirty="0"/>
-              <a:t>И что мне делать?</a:t>
+              <a:t>Так есть ли Сила Воли?</a:t>
             </a:r>
             <a:endParaRPr lang="en-US" dirty="0"/>
           </a:p>
@@ -24301,30 +25022,49 @@
             <p:ph idx="1"/>
           </p:nvPr>
         </p:nvSpPr>
-        <p:spPr>
-          <a:xfrm>
-            <a:off x="1154955" y="2603500"/>
-            <a:ext cx="10077904" cy="3416300"/>
-          </a:xfrm>
-        </p:spPr>
-        <p:txBody>
-          <a:bodyPr/>
+        <p:spPr/>
+        <p:txBody>
+          <a:bodyPr>
+            <a:normAutofit/>
+          </a:bodyPr>
           <a:lstStyle/>
           <a:p>
             <a:r>
               <a:rPr lang="ru-RU" dirty="0"/>
-              <a:t>Прислушивайся к себе. Чего ты хочешь? Какую проблему ты пытаешься решить?</a:t>
+              <a:t>Если мы под силой воли подразумеваем способность управлять самим собой (самоконтроль/дисциплина) и ходом своей жизни таким образом, что бы добиваться всех намеченных целей и реализовывать практически любые свои желания. – Ответ: </a:t>
+            </a:r>
+            <a:r>
+              <a:rPr lang="ru-RU" sz="2000" b="1" dirty="0"/>
+              <a:t>Да</a:t>
+            </a:r>
+            <a:r>
+              <a:rPr lang="ru-RU" dirty="0"/>
+              <a:t>. </a:t>
             </a:r>
           </a:p>
           <a:p>
             <a:endParaRPr lang="ru-RU" dirty="0"/>
+          </a:p>
+          <a:p>
+            <a:r>
+              <a:rPr lang="ru-RU" dirty="0"/>
+              <a:t>Поможет ли нам Сила Воли? – ответ: </a:t>
+            </a:r>
+            <a:r>
+              <a:rPr lang="ru-RU" sz="2000" b="1" dirty="0"/>
+              <a:t>Нет</a:t>
+            </a:r>
+            <a:r>
+              <a:rPr lang="ru-RU" b="1" dirty="0"/>
+              <a:t>.</a:t>
+            </a:r>
           </a:p>
         </p:txBody>
       </p:sp>
     </p:spTree>
     <p:extLst>
       <p:ext uri="{BB962C8B-B14F-4D97-AF65-F5344CB8AC3E}">
-        <p14:creationId xmlns:p14="http://schemas.microsoft.com/office/powerpoint/2010/main" val="4079798762"/>
+        <p14:creationId xmlns:p14="http://schemas.microsoft.com/office/powerpoint/2010/main" val="3424737229"/>
       </p:ext>
     </p:extLst>
   </p:cSld>
@@ -24398,28 +25138,13 @@
         </p:nvSpPr>
         <p:spPr>
           <a:xfrm>
-            <a:off x="1154954" y="2603500"/>
-            <a:ext cx="10279239" cy="3416300"/>
+            <a:off x="1154955" y="2603500"/>
+            <a:ext cx="10077904" cy="3416300"/>
           </a:xfrm>
         </p:spPr>
         <p:txBody>
           <a:bodyPr/>
           <a:lstStyle/>
-          <a:p>
-            <a:r>
-              <a:rPr lang="ru-RU" dirty="0"/>
-              <a:t>Прислушивайся к себе. Чего ты хочешь? Какую проблему ты пытаешься решить?</a:t>
-            </a:r>
-          </a:p>
-          <a:p>
-            <a:endParaRPr lang="ru-RU" dirty="0"/>
-          </a:p>
-          <a:p>
-            <a:r>
-              <a:rPr lang="ru-RU" dirty="0"/>
-              <a:t>Задавай вопросы сам себе. И пытайся найти ответы.</a:t>
-            </a:r>
-          </a:p>
           <a:p>
             <a:endParaRPr lang="ru-RU" dirty="0"/>
           </a:p>
@@ -24428,7 +25153,7 @@
     </p:spTree>
     <p:extLst>
       <p:ext uri="{BB962C8B-B14F-4D97-AF65-F5344CB8AC3E}">
-        <p14:creationId xmlns:p14="http://schemas.microsoft.com/office/powerpoint/2010/main" val="4171558127"/>
+        <p14:creationId xmlns:p14="http://schemas.microsoft.com/office/powerpoint/2010/main" val="104215905"/>
       </p:ext>
     </p:extLst>
   </p:cSld>
@@ -24623,8 +25348,8 @@
         </p:nvSpPr>
         <p:spPr>
           <a:xfrm>
-            <a:off x="1154954" y="2603500"/>
-            <a:ext cx="10430241" cy="3416300"/>
+            <a:off x="1154955" y="2603500"/>
+            <a:ext cx="10077904" cy="3416300"/>
           </a:xfrm>
         </p:spPr>
         <p:txBody>
@@ -24634,24 +25359,6 @@
             <a:r>
               <a:rPr lang="ru-RU" dirty="0"/>
               <a:t>Прислушивайся к себе. Чего ты хочешь? Какую проблему ты пытаешься решить?</a:t>
-            </a:r>
-          </a:p>
-          <a:p>
-            <a:endParaRPr lang="ru-RU" dirty="0"/>
-          </a:p>
-          <a:p>
-            <a:r>
-              <a:rPr lang="ru-RU" dirty="0"/>
-              <a:t>Задавай вопросы сам себе. И пытайся найти ответы.</a:t>
-            </a:r>
-          </a:p>
-          <a:p>
-            <a:endParaRPr lang="ru-RU" dirty="0"/>
-          </a:p>
-          <a:p>
-            <a:r>
-              <a:rPr lang="ru-RU" dirty="0"/>
-              <a:t>Найди баланс.</a:t>
             </a:r>
           </a:p>
           <a:p>
@@ -24662,7 +25369,7 @@
     </p:spTree>
     <p:extLst>
       <p:ext uri="{BB962C8B-B14F-4D97-AF65-F5344CB8AC3E}">
-        <p14:creationId xmlns:p14="http://schemas.microsoft.com/office/powerpoint/2010/main" val="1501391458"/>
+        <p14:creationId xmlns:p14="http://schemas.microsoft.com/office/powerpoint/2010/main" val="4079798762"/>
       </p:ext>
     </p:extLst>
   </p:cSld>
@@ -24737,7 +25444,7 @@
         <p:spPr>
           <a:xfrm>
             <a:off x="1154954" y="2603500"/>
-            <a:ext cx="10312795" cy="3416300"/>
+            <a:ext cx="10279239" cy="3416300"/>
           </a:xfrm>
         </p:spPr>
         <p:txBody>
@@ -24756,36 +25463,6 @@
             <a:r>
               <a:rPr lang="ru-RU" dirty="0"/>
               <a:t>Задавай вопросы сам себе. И пытайся найти ответы.</a:t>
-            </a:r>
-          </a:p>
-          <a:p>
-            <a:endParaRPr lang="ru-RU" dirty="0"/>
-          </a:p>
-          <a:p>
-            <a:r>
-              <a:rPr lang="ru-RU" dirty="0"/>
-              <a:t>Найди баланс.</a:t>
-            </a:r>
-          </a:p>
-          <a:p>
-            <a:endParaRPr lang="ru-RU" dirty="0"/>
-          </a:p>
-          <a:p>
-            <a:r>
-              <a:rPr lang="ru-RU" dirty="0"/>
-              <a:t>Найди ту конфигурацию которая будет работать именно для тебя. Пойми что нету той </a:t>
-            </a:r>
-            <a:r>
-              <a:rPr lang="en-US" i="1" dirty="0"/>
-              <a:t>silver bullet</a:t>
-            </a:r>
-            <a:r>
-              <a:rPr lang="en-US" dirty="0"/>
-              <a:t> </a:t>
-            </a:r>
-            <a:r>
-              <a:rPr lang="ru-RU" dirty="0"/>
-              <a:t>которую все пытаются найти.</a:t>
             </a:r>
           </a:p>
           <a:p>
@@ -24796,7 +25473,7 @@
     </p:spTree>
     <p:extLst>
       <p:ext uri="{BB962C8B-B14F-4D97-AF65-F5344CB8AC3E}">
-        <p14:creationId xmlns:p14="http://schemas.microsoft.com/office/powerpoint/2010/main" val="2916773178"/>
+        <p14:creationId xmlns:p14="http://schemas.microsoft.com/office/powerpoint/2010/main" val="4171558127"/>
       </p:ext>
     </p:extLst>
   </p:cSld>
@@ -24839,27 +25516,14 @@
             <p:ph type="title"/>
           </p:nvPr>
         </p:nvSpPr>
-        <p:spPr>
-          <a:xfrm>
-            <a:off x="1154953" y="973668"/>
-            <a:ext cx="9457120" cy="706964"/>
-          </a:xfrm>
-        </p:spPr>
+        <p:spPr/>
         <p:txBody>
           <a:bodyPr/>
           <a:lstStyle/>
           <a:p>
             <a:r>
               <a:rPr lang="ru-RU" dirty="0"/>
-              <a:t>А</a:t>
-            </a:r>
-            <a:r>
-              <a:rPr lang="en-US" dirty="0"/>
-              <a:t> </a:t>
-            </a:r>
-            <a:r>
-              <a:rPr lang="ru-RU" dirty="0"/>
-              <a:t>зачем нам всё это?</a:t>
+              <a:t>И что мне делать?</a:t>
             </a:r>
             <a:endParaRPr lang="en-US" dirty="0"/>
           </a:p>
@@ -24881,22 +25545,48 @@
             <p:ph idx="1"/>
           </p:nvPr>
         </p:nvSpPr>
-        <p:spPr/>
+        <p:spPr>
+          <a:xfrm>
+            <a:off x="1154954" y="2603500"/>
+            <a:ext cx="10430241" cy="3416300"/>
+          </a:xfrm>
+        </p:spPr>
         <p:txBody>
           <a:bodyPr/>
           <a:lstStyle/>
           <a:p>
             <a:r>
               <a:rPr lang="ru-RU" dirty="0"/>
-              <a:t>Какую проблему мы вообще пытаемся решить?</a:t>
-            </a:r>
+              <a:t>Прислушивайся к себе. Чего ты хочешь? Какую проблему ты пытаешься решить?</a:t>
+            </a:r>
+          </a:p>
+          <a:p>
+            <a:endParaRPr lang="ru-RU" dirty="0"/>
+          </a:p>
+          <a:p>
+            <a:r>
+              <a:rPr lang="ru-RU" dirty="0"/>
+              <a:t>Задавай вопросы сам себе. И пытайся найти ответы.</a:t>
+            </a:r>
+          </a:p>
+          <a:p>
+            <a:endParaRPr lang="ru-RU" dirty="0"/>
+          </a:p>
+          <a:p>
+            <a:r>
+              <a:rPr lang="ru-RU" dirty="0"/>
+              <a:t>Найди баланс.</a:t>
+            </a:r>
+          </a:p>
+          <a:p>
+            <a:endParaRPr lang="ru-RU" dirty="0"/>
           </a:p>
         </p:txBody>
       </p:sp>
     </p:spTree>
     <p:extLst>
       <p:ext uri="{BB962C8B-B14F-4D97-AF65-F5344CB8AC3E}">
-        <p14:creationId xmlns:p14="http://schemas.microsoft.com/office/powerpoint/2010/main" val="337745344"/>
+        <p14:creationId xmlns:p14="http://schemas.microsoft.com/office/powerpoint/2010/main" val="1501391458"/>
       </p:ext>
     </p:extLst>
   </p:cSld>
@@ -24939,19 +25629,14 @@
             <p:ph type="title"/>
           </p:nvPr>
         </p:nvSpPr>
-        <p:spPr>
-          <a:xfrm>
-            <a:off x="1154953" y="973668"/>
-            <a:ext cx="9457120" cy="706964"/>
-          </a:xfrm>
-        </p:spPr>
+        <p:spPr/>
         <p:txBody>
           <a:bodyPr/>
           <a:lstStyle/>
           <a:p>
             <a:r>
               <a:rPr lang="ru-RU" dirty="0"/>
-              <a:t>Цель</a:t>
+              <a:t>И что мне делать?</a:t>
             </a:r>
             <a:endParaRPr lang="en-US" dirty="0"/>
           </a:p>
@@ -24973,20 +25658,58 @@
             <p:ph idx="1"/>
           </p:nvPr>
         </p:nvSpPr>
-        <p:spPr/>
+        <p:spPr>
+          <a:xfrm>
+            <a:off x="1154954" y="2603500"/>
+            <a:ext cx="10312795" cy="3416300"/>
+          </a:xfrm>
+        </p:spPr>
         <p:txBody>
           <a:bodyPr/>
           <a:lstStyle/>
           <a:p>
             <a:r>
               <a:rPr lang="ru-RU" dirty="0"/>
-              <a:t>Нету важного.</a:t>
-            </a:r>
+              <a:t>Прислушивайся к себе. Чего ты хочешь? Какую проблему ты пытаешься решить?</a:t>
+            </a:r>
+          </a:p>
+          <a:p>
+            <a:endParaRPr lang="ru-RU" dirty="0"/>
           </a:p>
           <a:p>
             <a:r>
               <a:rPr lang="ru-RU" dirty="0"/>
-              <a:t>Нету потребного будущего.</a:t>
+              <a:t>Задавай вопросы сам себе. И пытайся найти ответы.</a:t>
+            </a:r>
+          </a:p>
+          <a:p>
+            <a:endParaRPr lang="ru-RU" dirty="0"/>
+          </a:p>
+          <a:p>
+            <a:r>
+              <a:rPr lang="ru-RU" dirty="0"/>
+              <a:t>Найди баланс.</a:t>
+            </a:r>
+          </a:p>
+          <a:p>
+            <a:endParaRPr lang="ru-RU" dirty="0"/>
+          </a:p>
+          <a:p>
+            <a:r>
+              <a:rPr lang="ru-RU" dirty="0"/>
+              <a:t>Найди ту конфигурацию которая будет работать именно для тебя. Пойми что нету той </a:t>
+            </a:r>
+            <a:r>
+              <a:rPr lang="en-US" i="1" dirty="0"/>
+              <a:t>silver bullet</a:t>
+            </a:r>
+            <a:r>
+              <a:rPr lang="en-US" dirty="0"/>
+              <a:t> </a:t>
+            </a:r>
+            <a:r>
+              <a:rPr lang="ru-RU" dirty="0"/>
+              <a:t>которую все пытаются найти.</a:t>
             </a:r>
           </a:p>
           <a:p>
@@ -24997,7 +25720,7 @@
     </p:spTree>
     <p:extLst>
       <p:ext uri="{BB962C8B-B14F-4D97-AF65-F5344CB8AC3E}">
-        <p14:creationId xmlns:p14="http://schemas.microsoft.com/office/powerpoint/2010/main" val="3636438701"/>
+        <p14:creationId xmlns:p14="http://schemas.microsoft.com/office/powerpoint/2010/main" val="2916773178"/>
       </p:ext>
     </p:extLst>
   </p:cSld>
@@ -25040,14 +25763,27 @@
             <p:ph type="title"/>
           </p:nvPr>
         </p:nvSpPr>
-        <p:spPr/>
+        <p:spPr>
+          <a:xfrm>
+            <a:off x="1154953" y="973668"/>
+            <a:ext cx="9457120" cy="706964"/>
+          </a:xfrm>
+        </p:spPr>
         <p:txBody>
           <a:bodyPr/>
           <a:lstStyle/>
           <a:p>
             <a:r>
               <a:rPr lang="ru-RU" dirty="0"/>
-              <a:t>Советы</a:t>
+              <a:t>А</a:t>
+            </a:r>
+            <a:r>
+              <a:rPr lang="en-US" dirty="0"/>
+              <a:t> </a:t>
+            </a:r>
+            <a:r>
+              <a:rPr lang="ru-RU" dirty="0"/>
+              <a:t>зачем нам всё это?</a:t>
             </a:r>
             <a:endParaRPr lang="en-US" dirty="0"/>
           </a:p>
@@ -25074,14 +25810,17 @@
           <a:bodyPr/>
           <a:lstStyle/>
           <a:p>
-            <a:endParaRPr lang="ru-RU" dirty="0"/>
+            <a:r>
+              <a:rPr lang="ru-RU" dirty="0"/>
+              <a:t>Какую проблему мы вообще пытаемся решить?</a:t>
+            </a:r>
           </a:p>
         </p:txBody>
       </p:sp>
     </p:spTree>
     <p:extLst>
       <p:ext uri="{BB962C8B-B14F-4D97-AF65-F5344CB8AC3E}">
-        <p14:creationId xmlns:p14="http://schemas.microsoft.com/office/powerpoint/2010/main" val="2746810043"/>
+        <p14:creationId xmlns:p14="http://schemas.microsoft.com/office/powerpoint/2010/main" val="337745344"/>
       </p:ext>
     </p:extLst>
   </p:cSld>
@@ -25124,14 +25863,19 @@
             <p:ph type="title"/>
           </p:nvPr>
         </p:nvSpPr>
-        <p:spPr/>
+        <p:spPr>
+          <a:xfrm>
+            <a:off x="1154953" y="973668"/>
+            <a:ext cx="9457120" cy="706964"/>
+          </a:xfrm>
+        </p:spPr>
         <p:txBody>
           <a:bodyPr/>
           <a:lstStyle/>
           <a:p>
             <a:r>
               <a:rPr lang="ru-RU" dirty="0"/>
-              <a:t>Советы</a:t>
+              <a:t>Цель</a:t>
             </a:r>
             <a:endParaRPr lang="en-US" dirty="0"/>
           </a:p>
@@ -25160,7 +25904,13 @@
           <a:p>
             <a:r>
               <a:rPr lang="ru-RU" dirty="0"/>
-              <a:t>Спите.</a:t>
+              <a:t>Нету важного.</a:t>
+            </a:r>
+          </a:p>
+          <a:p>
+            <a:r>
+              <a:rPr lang="ru-RU" dirty="0"/>
+              <a:t>Нету потребного будущего.</a:t>
             </a:r>
           </a:p>
           <a:p>
@@ -25171,7 +25921,7 @@
     </p:spTree>
     <p:extLst>
       <p:ext uri="{BB962C8B-B14F-4D97-AF65-F5344CB8AC3E}">
-        <p14:creationId xmlns:p14="http://schemas.microsoft.com/office/powerpoint/2010/main" val="1528982406"/>
+        <p14:creationId xmlns:p14="http://schemas.microsoft.com/office/powerpoint/2010/main" val="3636438701"/>
       </p:ext>
     </p:extLst>
   </p:cSld>
@@ -25248,18 +25998,6 @@
           <a:bodyPr/>
           <a:lstStyle/>
           <a:p>
-            <a:r>
-              <a:rPr lang="ru-RU" dirty="0"/>
-              <a:t>Спите.</a:t>
-            </a:r>
-          </a:p>
-          <a:p>
-            <a:r>
-              <a:rPr lang="ru-RU" dirty="0"/>
-              <a:t>Практикуйте осознанность.</a:t>
-            </a:r>
-          </a:p>
-          <a:p>
             <a:endParaRPr lang="ru-RU" dirty="0"/>
           </a:p>
         </p:txBody>
@@ -25267,7 +26005,7 @@
     </p:spTree>
     <p:extLst>
       <p:ext uri="{BB962C8B-B14F-4D97-AF65-F5344CB8AC3E}">
-        <p14:creationId xmlns:p14="http://schemas.microsoft.com/office/powerpoint/2010/main" val="2212550543"/>
+        <p14:creationId xmlns:p14="http://schemas.microsoft.com/office/powerpoint/2010/main" val="2746810043"/>
       </p:ext>
     </p:extLst>
   </p:cSld>
@@ -25350,18 +26088,6 @@
             </a:r>
           </a:p>
           <a:p>
-            <a:r>
-              <a:rPr lang="ru-RU" dirty="0"/>
-              <a:t>Практикуйте осознанность.</a:t>
-            </a:r>
-          </a:p>
-          <a:p>
-            <a:r>
-              <a:rPr lang="ru-RU" dirty="0"/>
-              <a:t>Дневник и рефлексия.</a:t>
-            </a:r>
-          </a:p>
-          <a:p>
             <a:endParaRPr lang="ru-RU" dirty="0"/>
           </a:p>
         </p:txBody>
@@ -25369,7 +26095,7 @@
     </p:spTree>
     <p:extLst>
       <p:ext uri="{BB962C8B-B14F-4D97-AF65-F5344CB8AC3E}">
-        <p14:creationId xmlns:p14="http://schemas.microsoft.com/office/powerpoint/2010/main" val="1994819522"/>
+        <p14:creationId xmlns:p14="http://schemas.microsoft.com/office/powerpoint/2010/main" val="1528982406"/>
       </p:ext>
     </p:extLst>
   </p:cSld>
@@ -25458,18 +26184,6 @@
             </a:r>
           </a:p>
           <a:p>
-            <a:r>
-              <a:rPr lang="ru-RU" dirty="0"/>
-              <a:t>Дневник и рефлексия.</a:t>
-            </a:r>
-          </a:p>
-          <a:p>
-            <a:r>
-              <a:rPr lang="ru-RU" dirty="0"/>
-              <a:t>Занимайтесь медитацией.</a:t>
-            </a:r>
-          </a:p>
-          <a:p>
             <a:endParaRPr lang="ru-RU" dirty="0"/>
           </a:p>
         </p:txBody>
@@ -25477,7 +26191,7 @@
     </p:spTree>
     <p:extLst>
       <p:ext uri="{BB962C8B-B14F-4D97-AF65-F5344CB8AC3E}">
-        <p14:creationId xmlns:p14="http://schemas.microsoft.com/office/powerpoint/2010/main" val="4166029998"/>
+        <p14:creationId xmlns:p14="http://schemas.microsoft.com/office/powerpoint/2010/main" val="2212550543"/>
       </p:ext>
     </p:extLst>
   </p:cSld>
@@ -25572,18 +26286,6 @@
             </a:r>
           </a:p>
           <a:p>
-            <a:r>
-              <a:rPr lang="ru-RU" dirty="0"/>
-              <a:t>Занимайтесь медитацией.</a:t>
-            </a:r>
-          </a:p>
-          <a:p>
-            <a:r>
-              <a:rPr lang="ru-RU" dirty="0"/>
-              <a:t>Научитесь правильно Отдыхать.</a:t>
-            </a:r>
-          </a:p>
-          <a:p>
             <a:endParaRPr lang="ru-RU" dirty="0"/>
           </a:p>
         </p:txBody>
@@ -25591,7 +26293,7 @@
     </p:spTree>
     <p:extLst>
       <p:ext uri="{BB962C8B-B14F-4D97-AF65-F5344CB8AC3E}">
-        <p14:creationId xmlns:p14="http://schemas.microsoft.com/office/powerpoint/2010/main" val="3581029079"/>
+        <p14:creationId xmlns:p14="http://schemas.microsoft.com/office/powerpoint/2010/main" val="1994819522"/>
       </p:ext>
     </p:extLst>
   </p:cSld>
@@ -25822,18 +26524,6 @@
             </a:r>
           </a:p>
           <a:p>
-            <a:r>
-              <a:rPr lang="ru-RU" dirty="0"/>
-              <a:t>Научитесь правильно Отдыхать.</a:t>
-            </a:r>
-          </a:p>
-          <a:p>
-            <a:r>
-              <a:rPr lang="ru-RU" dirty="0"/>
-              <a:t>Заведите ритуалы и привычки.</a:t>
-            </a:r>
-          </a:p>
-          <a:p>
             <a:endParaRPr lang="ru-RU" dirty="0"/>
           </a:p>
         </p:txBody>
@@ -25841,7 +26531,7 @@
     </p:spTree>
     <p:extLst>
       <p:ext uri="{BB962C8B-B14F-4D97-AF65-F5344CB8AC3E}">
-        <p14:creationId xmlns:p14="http://schemas.microsoft.com/office/powerpoint/2010/main" val="914086317"/>
+        <p14:creationId xmlns:p14="http://schemas.microsoft.com/office/powerpoint/2010/main" val="4166029998"/>
       </p:ext>
     </p:extLst>
   </p:cSld>
@@ -25948,18 +26638,6 @@
             </a:r>
           </a:p>
           <a:p>
-            <a:r>
-              <a:rPr lang="ru-RU" dirty="0"/>
-              <a:t>Заведите ритуалы и привычки.</a:t>
-            </a:r>
-          </a:p>
-          <a:p>
-            <a:r>
-              <a:rPr lang="ru-RU" dirty="0"/>
-              <a:t>Будьте позитивны.</a:t>
-            </a:r>
-          </a:p>
-          <a:p>
             <a:endParaRPr lang="ru-RU" dirty="0"/>
           </a:p>
         </p:txBody>
@@ -25967,7 +26645,7 @@
     </p:spTree>
     <p:extLst>
       <p:ext uri="{BB962C8B-B14F-4D97-AF65-F5344CB8AC3E}">
-        <p14:creationId xmlns:p14="http://schemas.microsoft.com/office/powerpoint/2010/main" val="591118877"/>
+        <p14:creationId xmlns:p14="http://schemas.microsoft.com/office/powerpoint/2010/main" val="3581029079"/>
       </p:ext>
     </p:extLst>
   </p:cSld>
@@ -26080,6 +26758,252 @@
             </a:r>
           </a:p>
           <a:p>
+            <a:endParaRPr lang="ru-RU" dirty="0"/>
+          </a:p>
+        </p:txBody>
+      </p:sp>
+    </p:spTree>
+    <p:extLst>
+      <p:ext uri="{BB962C8B-B14F-4D97-AF65-F5344CB8AC3E}">
+        <p14:creationId xmlns:p14="http://schemas.microsoft.com/office/powerpoint/2010/main" val="914086317"/>
+      </p:ext>
+    </p:extLst>
+  </p:cSld>
+  <p:clrMapOvr>
+    <a:masterClrMapping/>
+  </p:clrMapOvr>
+</p:sld>
+</file>
+
+<file path=ppt/slides/slide63.xml><?xml version="1.0" encoding="utf-8"?>
+<p:sld xmlns:a="http://schemas.openxmlformats.org/drawingml/2006/main" xmlns:r="http://schemas.openxmlformats.org/officeDocument/2006/relationships" xmlns:p="http://schemas.openxmlformats.org/presentationml/2006/main">
+  <p:cSld>
+    <p:spTree>
+      <p:nvGrpSpPr>
+        <p:cNvPr id="1" name=""/>
+        <p:cNvGrpSpPr/>
+        <p:nvPr/>
+      </p:nvGrpSpPr>
+      <p:grpSpPr>
+        <a:xfrm>
+          <a:off x="0" y="0"/>
+          <a:ext cx="0" cy="0"/>
+          <a:chOff x="0" y="0"/>
+          <a:chExt cx="0" cy="0"/>
+        </a:xfrm>
+      </p:grpSpPr>
+      <p:sp>
+        <p:nvSpPr>
+          <p:cNvPr id="2" name="Title 1">
+            <a:extLst>
+              <a:ext uri="{FF2B5EF4-FFF2-40B4-BE49-F238E27FC236}">
+                <a16:creationId xmlns:a16="http://schemas.microsoft.com/office/drawing/2014/main" id="{8502BE21-50A6-4F8E-83CA-2BE2172D726F}"/>
+              </a:ext>
+            </a:extLst>
+          </p:cNvPr>
+          <p:cNvSpPr>
+            <a:spLocks noGrp="1"/>
+          </p:cNvSpPr>
+          <p:nvPr>
+            <p:ph type="title"/>
+          </p:nvPr>
+        </p:nvSpPr>
+        <p:spPr/>
+        <p:txBody>
+          <a:bodyPr/>
+          <a:lstStyle/>
+          <a:p>
+            <a:r>
+              <a:rPr lang="ru-RU" dirty="0"/>
+              <a:t>Советы</a:t>
+            </a:r>
+            <a:endParaRPr lang="en-US" dirty="0"/>
+          </a:p>
+        </p:txBody>
+      </p:sp>
+      <p:sp>
+        <p:nvSpPr>
+          <p:cNvPr id="3" name="Content Placeholder 2">
+            <a:extLst>
+              <a:ext uri="{FF2B5EF4-FFF2-40B4-BE49-F238E27FC236}">
+                <a16:creationId xmlns:a16="http://schemas.microsoft.com/office/drawing/2014/main" id="{F7D9122A-547D-4498-81E3-940AF608A4E2}"/>
+              </a:ext>
+            </a:extLst>
+          </p:cNvPr>
+          <p:cNvSpPr>
+            <a:spLocks noGrp="1"/>
+          </p:cNvSpPr>
+          <p:nvPr>
+            <p:ph idx="1"/>
+          </p:nvPr>
+        </p:nvSpPr>
+        <p:spPr/>
+        <p:txBody>
+          <a:bodyPr/>
+          <a:lstStyle/>
+          <a:p>
+            <a:r>
+              <a:rPr lang="ru-RU" dirty="0"/>
+              <a:t>Спите.</a:t>
+            </a:r>
+          </a:p>
+          <a:p>
+            <a:r>
+              <a:rPr lang="ru-RU" dirty="0"/>
+              <a:t>Практикуйте осознанность.</a:t>
+            </a:r>
+          </a:p>
+          <a:p>
+            <a:r>
+              <a:rPr lang="ru-RU" dirty="0"/>
+              <a:t>Дневник и рефлексия.</a:t>
+            </a:r>
+          </a:p>
+          <a:p>
+            <a:r>
+              <a:rPr lang="ru-RU" dirty="0"/>
+              <a:t>Занимайтесь медитацией.</a:t>
+            </a:r>
+          </a:p>
+          <a:p>
+            <a:r>
+              <a:rPr lang="ru-RU" dirty="0"/>
+              <a:t>Научитесь правильно Отдыхать.</a:t>
+            </a:r>
+          </a:p>
+          <a:p>
+            <a:r>
+              <a:rPr lang="ru-RU" dirty="0"/>
+              <a:t>Заведите ритуалы и привычки.</a:t>
+            </a:r>
+          </a:p>
+          <a:p>
+            <a:r>
+              <a:rPr lang="ru-RU" dirty="0"/>
+              <a:t>Будьте позитивны.</a:t>
+            </a:r>
+          </a:p>
+          <a:p>
+            <a:endParaRPr lang="ru-RU" dirty="0"/>
+          </a:p>
+        </p:txBody>
+      </p:sp>
+    </p:spTree>
+    <p:extLst>
+      <p:ext uri="{BB962C8B-B14F-4D97-AF65-F5344CB8AC3E}">
+        <p14:creationId xmlns:p14="http://schemas.microsoft.com/office/powerpoint/2010/main" val="591118877"/>
+      </p:ext>
+    </p:extLst>
+  </p:cSld>
+  <p:clrMapOvr>
+    <a:masterClrMapping/>
+  </p:clrMapOvr>
+</p:sld>
+</file>
+
+<file path=ppt/slides/slide64.xml><?xml version="1.0" encoding="utf-8"?>
+<p:sld xmlns:a="http://schemas.openxmlformats.org/drawingml/2006/main" xmlns:r="http://schemas.openxmlformats.org/officeDocument/2006/relationships" xmlns:p="http://schemas.openxmlformats.org/presentationml/2006/main">
+  <p:cSld>
+    <p:spTree>
+      <p:nvGrpSpPr>
+        <p:cNvPr id="1" name=""/>
+        <p:cNvGrpSpPr/>
+        <p:nvPr/>
+      </p:nvGrpSpPr>
+      <p:grpSpPr>
+        <a:xfrm>
+          <a:off x="0" y="0"/>
+          <a:ext cx="0" cy="0"/>
+          <a:chOff x="0" y="0"/>
+          <a:chExt cx="0" cy="0"/>
+        </a:xfrm>
+      </p:grpSpPr>
+      <p:sp>
+        <p:nvSpPr>
+          <p:cNvPr id="2" name="Title 1">
+            <a:extLst>
+              <a:ext uri="{FF2B5EF4-FFF2-40B4-BE49-F238E27FC236}">
+                <a16:creationId xmlns:a16="http://schemas.microsoft.com/office/drawing/2014/main" id="{8502BE21-50A6-4F8E-83CA-2BE2172D726F}"/>
+              </a:ext>
+            </a:extLst>
+          </p:cNvPr>
+          <p:cNvSpPr>
+            <a:spLocks noGrp="1"/>
+          </p:cNvSpPr>
+          <p:nvPr>
+            <p:ph type="title"/>
+          </p:nvPr>
+        </p:nvSpPr>
+        <p:spPr/>
+        <p:txBody>
+          <a:bodyPr/>
+          <a:lstStyle/>
+          <a:p>
+            <a:r>
+              <a:rPr lang="ru-RU" dirty="0"/>
+              <a:t>Советы</a:t>
+            </a:r>
+            <a:endParaRPr lang="en-US" dirty="0"/>
+          </a:p>
+        </p:txBody>
+      </p:sp>
+      <p:sp>
+        <p:nvSpPr>
+          <p:cNvPr id="3" name="Content Placeholder 2">
+            <a:extLst>
+              <a:ext uri="{FF2B5EF4-FFF2-40B4-BE49-F238E27FC236}">
+                <a16:creationId xmlns:a16="http://schemas.microsoft.com/office/drawing/2014/main" id="{F7D9122A-547D-4498-81E3-940AF608A4E2}"/>
+              </a:ext>
+            </a:extLst>
+          </p:cNvPr>
+          <p:cNvSpPr>
+            <a:spLocks noGrp="1"/>
+          </p:cNvSpPr>
+          <p:nvPr>
+            <p:ph idx="1"/>
+          </p:nvPr>
+        </p:nvSpPr>
+        <p:spPr/>
+        <p:txBody>
+          <a:bodyPr/>
+          <a:lstStyle/>
+          <a:p>
+            <a:r>
+              <a:rPr lang="ru-RU" dirty="0"/>
+              <a:t>Спите.</a:t>
+            </a:r>
+          </a:p>
+          <a:p>
+            <a:r>
+              <a:rPr lang="ru-RU" dirty="0"/>
+              <a:t>Практикуйте осознанность.</a:t>
+            </a:r>
+          </a:p>
+          <a:p>
+            <a:r>
+              <a:rPr lang="ru-RU" dirty="0"/>
+              <a:t>Дневник и рефлексия.</a:t>
+            </a:r>
+          </a:p>
+          <a:p>
+            <a:r>
+              <a:rPr lang="ru-RU" dirty="0"/>
+              <a:t>Занимайтесь медитацией.</a:t>
+            </a:r>
+          </a:p>
+          <a:p>
+            <a:r>
+              <a:rPr lang="ru-RU" dirty="0"/>
+              <a:t>Научитесь правильно Отдыхать.</a:t>
+            </a:r>
+          </a:p>
+          <a:p>
+            <a:r>
+              <a:rPr lang="ru-RU" dirty="0"/>
+              <a:t>Заведите ритуалы и привычки.</a:t>
+            </a:r>
+          </a:p>
+          <a:p>
             <a:r>
               <a:rPr lang="ru-RU" dirty="0"/>
               <a:t>Будьте позитивны.</a:t>
@@ -26110,7 +27034,7 @@
 </p:sld>
 </file>
 
-<file path=ppt/slides/slide63.xml><?xml version="1.0" encoding="utf-8"?>
+<file path=ppt/slides/slide65.xml><?xml version="1.0" encoding="utf-8"?>
 <p:sld xmlns:a="http://schemas.openxmlformats.org/drawingml/2006/main" xmlns:r="http://schemas.openxmlformats.org/officeDocument/2006/relationships" xmlns:p="http://schemas.openxmlformats.org/presentationml/2006/main">
   <p:cSld>
     <p:spTree>

</xml_diff>

<commit_message>
feat: update presentation for willpower
</commit_message>
<xml_diff>
--- a/softskills/willpower/willpower.pptx
+++ b/softskills/willpower/willpower.pptx
@@ -47,31 +47,31 @@
     <p:sldId id="345" r:id="rId38"/>
     <p:sldId id="350" r:id="rId39"/>
     <p:sldId id="346" r:id="rId40"/>
-    <p:sldId id="317" r:id="rId41"/>
-    <p:sldId id="352" r:id="rId42"/>
-    <p:sldId id="321" r:id="rId43"/>
-    <p:sldId id="266" r:id="rId44"/>
-    <p:sldId id="267" r:id="rId45"/>
-    <p:sldId id="318" r:id="rId46"/>
-    <p:sldId id="287" r:id="rId47"/>
-    <p:sldId id="288" r:id="rId48"/>
-    <p:sldId id="289" r:id="rId49"/>
-    <p:sldId id="294" r:id="rId50"/>
-    <p:sldId id="348" r:id="rId51"/>
-    <p:sldId id="291" r:id="rId52"/>
-    <p:sldId id="292" r:id="rId53"/>
-    <p:sldId id="293" r:id="rId54"/>
-    <p:sldId id="277" r:id="rId55"/>
-    <p:sldId id="306" r:id="rId56"/>
-    <p:sldId id="305" r:id="rId57"/>
-    <p:sldId id="284" r:id="rId58"/>
-    <p:sldId id="278" r:id="rId59"/>
-    <p:sldId id="279" r:id="rId60"/>
-    <p:sldId id="280" r:id="rId61"/>
-    <p:sldId id="281" r:id="rId62"/>
-    <p:sldId id="282" r:id="rId63"/>
-    <p:sldId id="283" r:id="rId64"/>
-    <p:sldId id="347" r:id="rId65"/>
+    <p:sldId id="352" r:id="rId41"/>
+    <p:sldId id="321" r:id="rId42"/>
+    <p:sldId id="266" r:id="rId43"/>
+    <p:sldId id="267" r:id="rId44"/>
+    <p:sldId id="318" r:id="rId45"/>
+    <p:sldId id="287" r:id="rId46"/>
+    <p:sldId id="288" r:id="rId47"/>
+    <p:sldId id="289" r:id="rId48"/>
+    <p:sldId id="294" r:id="rId49"/>
+    <p:sldId id="348" r:id="rId50"/>
+    <p:sldId id="291" r:id="rId51"/>
+    <p:sldId id="292" r:id="rId52"/>
+    <p:sldId id="293" r:id="rId53"/>
+    <p:sldId id="277" r:id="rId54"/>
+    <p:sldId id="306" r:id="rId55"/>
+    <p:sldId id="305" r:id="rId56"/>
+    <p:sldId id="284" r:id="rId57"/>
+    <p:sldId id="278" r:id="rId58"/>
+    <p:sldId id="279" r:id="rId59"/>
+    <p:sldId id="280" r:id="rId60"/>
+    <p:sldId id="281" r:id="rId61"/>
+    <p:sldId id="282" r:id="rId62"/>
+    <p:sldId id="283" r:id="rId63"/>
+    <p:sldId id="347" r:id="rId64"/>
+    <p:sldId id="317" r:id="rId65"/>
     <p:sldId id="285" r:id="rId66"/>
   </p:sldIdLst>
   <p:sldSz cx="12192000" cy="6858000"/>
@@ -261,7 +261,7 @@
           <a:p>
             <a:fld id="{F1E91201-0078-4A3F-BC02-68DABEF5C8BB}" type="datetimeFigureOut">
               <a:rPr lang="en-US" smtClean="0"/>
-              <a:t>2/5/2021</a:t>
+              <a:t>2/11/2021</a:t>
             </a:fld>
             <a:endParaRPr lang="en-US"/>
           </a:p>
@@ -7332,7 +7332,7 @@
             <a:fld id="{1E700B27-DE4C-4B9E-BB11-B9027034A00F}" type="datetimeFigureOut">
               <a:rPr lang="en-US" dirty="0"/>
               <a:pPr/>
-              <a:t>2/5/2021</a:t>
+              <a:t>2/11/2021</a:t>
             </a:fld>
             <a:endParaRPr lang="en-US" dirty="0"/>
           </a:p>
@@ -8448,7 +8448,7 @@
           <a:p>
             <a:fld id="{C40F4739-9812-4A9F-890D-2AD6BA5F6EE8}" type="datetimeFigureOut">
               <a:rPr lang="en-US" dirty="0"/>
-              <a:t>2/5/2021</a:t>
+              <a:t>2/11/2021</a:t>
             </a:fld>
             <a:endParaRPr lang="en-US" dirty="0"/>
           </a:p>
@@ -9455,7 +9455,7 @@
           <a:p>
             <a:fld id="{18845AC5-A3F8-44AA-BA8F-596CDCC976D3}" type="datetimeFigureOut">
               <a:rPr lang="en-US" dirty="0"/>
-              <a:t>2/5/2021</a:t>
+              <a:t>2/11/2021</a:t>
             </a:fld>
             <a:endParaRPr lang="en-US" dirty="0"/>
           </a:p>
@@ -10621,7 +10621,7 @@
           <a:p>
             <a:fld id="{C873B183-A821-4095-A363-9EC968635539}" type="datetimeFigureOut">
               <a:rPr lang="en-US" dirty="0"/>
-              <a:t>2/5/2021</a:t>
+              <a:t>2/11/2021</a:t>
             </a:fld>
             <a:endParaRPr lang="en-US" dirty="0"/>
           </a:p>
@@ -11678,7 +11678,7 @@
           <a:p>
             <a:fld id="{174D01B4-0AA5-45E6-B2E6-5FA4078AEBCF}" type="datetimeFigureOut">
               <a:rPr lang="en-US" dirty="0"/>
-              <a:t>2/5/2021</a:t>
+              <a:t>2/11/2021</a:t>
             </a:fld>
             <a:endParaRPr lang="en-US" dirty="0"/>
           </a:p>
@@ -12320,7 +12320,7 @@
           <a:p>
             <a:fld id="{4147335C-0450-40D7-8612-B3203BED4F28}" type="datetimeFigureOut">
               <a:rPr lang="en-US" dirty="0"/>
-              <a:t>2/5/2021</a:t>
+              <a:t>2/11/2021</a:t>
             </a:fld>
             <a:endParaRPr lang="en-US" dirty="0"/>
           </a:p>
@@ -13163,7 +13163,7 @@
           <a:p>
             <a:fld id="{D246A105-2A1C-4284-B4EA-07CF89B1A393}" type="datetimeFigureOut">
               <a:rPr lang="en-US" dirty="0"/>
-              <a:t>2/5/2021</a:t>
+              <a:t>2/11/2021</a:t>
             </a:fld>
             <a:endParaRPr lang="en-US" dirty="0"/>
           </a:p>
@@ -13334,7 +13334,7 @@
           <a:p>
             <a:fld id="{80DBE609-F3F2-45E6-BD6A-E03A8C86C1AE}" type="datetimeFigureOut">
               <a:rPr lang="en-US" dirty="0"/>
-              <a:t>2/5/2021</a:t>
+              <a:t>2/11/2021</a:t>
             </a:fld>
             <a:endParaRPr lang="en-US" dirty="0"/>
           </a:p>
@@ -14328,7 +14328,7 @@
           <a:p>
             <a:fld id="{7A24AD68-089C-4467-A8F3-EA2BBCA6B44E}" type="datetimeFigureOut">
               <a:rPr lang="en-US" dirty="0"/>
-              <a:t>2/5/2021</a:t>
+              <a:t>2/11/2021</a:t>
             </a:fld>
             <a:endParaRPr lang="en-US" dirty="0"/>
           </a:p>
@@ -14530,7 +14530,7 @@
           <a:p>
             <a:fld id="{75C51FCE-E4BB-4680-8E50-3C0E348D2609}" type="datetimeFigureOut">
               <a:rPr lang="en-US" dirty="0"/>
-              <a:t>2/5/2021</a:t>
+              <a:t>2/11/2021</a:t>
             </a:fld>
             <a:endParaRPr lang="en-US" dirty="0"/>
           </a:p>
@@ -15588,7 +15588,7 @@
           <a:p>
             <a:fld id="{8AAA073D-A903-47F8-8D16-77642FB0DF1F}" type="datetimeFigureOut">
               <a:rPr lang="en-US" dirty="0"/>
-              <a:t>2/5/2021</a:t>
+              <a:t>2/11/2021</a:t>
             </a:fld>
             <a:endParaRPr lang="en-US" dirty="0"/>
           </a:p>
@@ -15856,7 +15856,7 @@
           <a:p>
             <a:fld id="{AB91FA40-626B-4CA1-85D0-7A9016E395BA}" type="datetimeFigureOut">
               <a:rPr lang="en-US" dirty="0"/>
-              <a:t>2/5/2021</a:t>
+              <a:t>2/11/2021</a:t>
             </a:fld>
             <a:endParaRPr lang="en-US" dirty="0"/>
           </a:p>
@@ -16234,7 +16234,7 @@
           <a:p>
             <a:fld id="{C3F425EA-B9DC-48A7-991E-9A82573B1B21}" type="datetimeFigureOut">
               <a:rPr lang="en-US" dirty="0"/>
-              <a:t>2/5/2021</a:t>
+              <a:t>2/11/2021</a:t>
             </a:fld>
             <a:endParaRPr lang="en-US" dirty="0"/>
           </a:p>
@@ -16348,7 +16348,7 @@
           <a:p>
             <a:fld id="{66CB97F8-6CEB-469B-AFCC-889F2A2B1D5A}" type="datetimeFigureOut">
               <a:rPr lang="en-US" dirty="0"/>
-              <a:t>2/5/2021</a:t>
+              <a:t>2/11/2021</a:t>
             </a:fld>
             <a:endParaRPr lang="en-US" dirty="0"/>
           </a:p>
@@ -16439,7 +16439,7 @@
           <a:p>
             <a:fld id="{8FA9179F-009E-4FA5-B091-7EBB82A185BD}" type="datetimeFigureOut">
               <a:rPr lang="en-US" dirty="0"/>
-              <a:t>2/5/2021</a:t>
+              <a:t>2/11/2021</a:t>
             </a:fld>
             <a:endParaRPr lang="en-US" dirty="0"/>
           </a:p>
@@ -17544,7 +17544,7 @@
           <a:p>
             <a:fld id="{8E665CEB-0076-4E37-B880-BCEA9784DE0A}" type="datetimeFigureOut">
               <a:rPr lang="en-US" dirty="0"/>
-              <a:t>2/5/2021</a:t>
+              <a:t>2/11/2021</a:t>
             </a:fld>
             <a:endParaRPr lang="en-US" dirty="0"/>
           </a:p>
@@ -18673,7 +18673,7 @@
           <a:p>
             <a:fld id="{A6149E5E-3896-4118-99A7-7B85668F1C5E}" type="datetimeFigureOut">
               <a:rPr lang="en-US" dirty="0"/>
-              <a:t>2/5/2021</a:t>
+              <a:t>2/11/2021</a:t>
             </a:fld>
             <a:endParaRPr lang="en-US" dirty="0"/>
           </a:p>
@@ -19697,7 +19697,7 @@
           <a:p>
             <a:fld id="{7E0D914D-B099-4142-A885-11F276715148}" type="datetimeFigureOut">
               <a:rPr lang="en-US" dirty="0"/>
-              <a:t>2/5/2021</a:t>
+              <a:t>2/11/2021</a:t>
             </a:fld>
             <a:endParaRPr lang="en-US" dirty="0"/>
           </a:p>
@@ -22600,7 +22600,7 @@
 </file>
 
 <file path=ppt/slides/slide29.xml><?xml version="1.0" encoding="utf-8"?>
-<p:sld xmlns:a="http://schemas.openxmlformats.org/drawingml/2006/main" xmlns:r="http://schemas.openxmlformats.org/officeDocument/2006/relationships" xmlns:p="http://schemas.openxmlformats.org/presentationml/2006/main">
+<p:sld xmlns:a="http://schemas.openxmlformats.org/drawingml/2006/main" xmlns:r="http://schemas.openxmlformats.org/officeDocument/2006/relationships" xmlns:p="http://schemas.openxmlformats.org/presentationml/2006/main" show="0">
   <p:cSld>
     <p:spTree>
       <p:nvGrpSpPr>
@@ -22790,7 +22790,7 @@
 </file>
 
 <file path=ppt/slides/slide30.xml><?xml version="1.0" encoding="utf-8"?>
-<p:sld xmlns:a="http://schemas.openxmlformats.org/drawingml/2006/main" xmlns:r="http://schemas.openxmlformats.org/officeDocument/2006/relationships" xmlns:p="http://schemas.openxmlformats.org/presentationml/2006/main">
+<p:sld xmlns:a="http://schemas.openxmlformats.org/drawingml/2006/main" xmlns:r="http://schemas.openxmlformats.org/officeDocument/2006/relationships" xmlns:p="http://schemas.openxmlformats.org/presentationml/2006/main" show="0">
   <p:cSld>
     <p:spTree>
       <p:nvGrpSpPr>
@@ -22886,7 +22886,7 @@
 </file>
 
 <file path=ppt/slides/slide31.xml><?xml version="1.0" encoding="utf-8"?>
-<p:sld xmlns:a="http://schemas.openxmlformats.org/drawingml/2006/main" xmlns:r="http://schemas.openxmlformats.org/officeDocument/2006/relationships" xmlns:p="http://schemas.openxmlformats.org/presentationml/2006/main">
+<p:sld xmlns:a="http://schemas.openxmlformats.org/drawingml/2006/main" xmlns:r="http://schemas.openxmlformats.org/officeDocument/2006/relationships" xmlns:p="http://schemas.openxmlformats.org/presentationml/2006/main" show="0">
   <p:cSld>
     <p:spTree>
       <p:nvGrpSpPr>
@@ -22988,7 +22988,7 @@
 </file>
 
 <file path=ppt/slides/slide32.xml><?xml version="1.0" encoding="utf-8"?>
-<p:sld xmlns:a="http://schemas.openxmlformats.org/drawingml/2006/main" xmlns:r="http://schemas.openxmlformats.org/officeDocument/2006/relationships" xmlns:p="http://schemas.openxmlformats.org/presentationml/2006/main">
+<p:sld xmlns:a="http://schemas.openxmlformats.org/drawingml/2006/main" xmlns:r="http://schemas.openxmlformats.org/officeDocument/2006/relationships" xmlns:p="http://schemas.openxmlformats.org/presentationml/2006/main" show="0">
   <p:cSld>
     <p:spTree>
       <p:nvGrpSpPr>
@@ -24290,36 +24290,19 @@
             <p:ph idx="1"/>
           </p:nvPr>
         </p:nvSpPr>
-        <p:spPr>
-          <a:xfrm>
-            <a:off x="1154955" y="3569464"/>
-            <a:ext cx="8761412" cy="2450335"/>
-          </a:xfrm>
-        </p:spPr>
+        <p:spPr/>
         <p:txBody>
           <a:bodyPr/>
           <a:lstStyle/>
           <a:p>
-            <a:pPr marL="0" indent="0" algn="ctr">
-              <a:buNone/>
-            </a:pPr>
-            <a:r>
-              <a:rPr lang="ru-RU" sz="1800" i="1" dirty="0">
-                <a:effectLst/>
-                <a:latin typeface="Century Gothic (Body)"/>
-              </a:rPr>
-              <a:t>Сохраните мировоззрение ученого. Пробуйте новое, собирайте собственные данные, прислушивайтесь к фактам. Будьте открыты неожиданным идеям, учитесь как на собственных ошибках, так и на успехах. Берегите то, что вам помогает, и делитесь знаниями с окружающими.</a:t>
-            </a:r>
-            <a:endParaRPr lang="ru-RU" i="1" dirty="0">
-              <a:latin typeface="Century Gothic (Body)"/>
-            </a:endParaRPr>
+            <a:endParaRPr lang="ru-RU" dirty="0"/>
           </a:p>
         </p:txBody>
       </p:sp>
     </p:spTree>
     <p:extLst>
       <p:ext uri="{BB962C8B-B14F-4D97-AF65-F5344CB8AC3E}">
-        <p14:creationId xmlns:p14="http://schemas.microsoft.com/office/powerpoint/2010/main" val="1639902987"/>
+        <p14:creationId xmlns:p14="http://schemas.microsoft.com/office/powerpoint/2010/main" val="846126053"/>
       </p:ext>
     </p:extLst>
   </p:cSld>
@@ -24330,7 +24313,7 @@
 </file>
 
 <file path=ppt/slides/slide41.xml><?xml version="1.0" encoding="utf-8"?>
-<p:sld xmlns:a="http://schemas.openxmlformats.org/drawingml/2006/main" xmlns:r="http://schemas.openxmlformats.org/officeDocument/2006/relationships" xmlns:p="http://schemas.openxmlformats.org/presentationml/2006/main">
+<p:sld xmlns:a="http://schemas.openxmlformats.org/drawingml/2006/main" xmlns:r="http://schemas.openxmlformats.org/officeDocument/2006/relationships" xmlns:p="http://schemas.openxmlformats.org/presentationml/2006/main" show="0">
   <p:cSld>
     <p:spTree>
       <p:nvGrpSpPr>
@@ -24369,7 +24352,7 @@
           <a:p>
             <a:r>
               <a:rPr lang="ru-RU" dirty="0"/>
-              <a:t>Резюме книги Келли Макгонигал</a:t>
+              <a:t>Бенжамин Харди</a:t>
             </a:r>
             <a:endParaRPr lang="en-US" dirty="0"/>
           </a:p>
@@ -24391,19 +24374,33 @@
             <p:ph idx="1"/>
           </p:nvPr>
         </p:nvSpPr>
-        <p:spPr/>
-        <p:txBody>
-          <a:bodyPr/>
+        <p:spPr>
+          <a:xfrm>
+            <a:off x="1154954" y="3816990"/>
+            <a:ext cx="9549397" cy="2202809"/>
+          </a:xfrm>
+        </p:spPr>
+        <p:txBody>
+          <a:bodyPr>
+            <a:normAutofit/>
+          </a:bodyPr>
           <a:lstStyle/>
           <a:p>
-            <a:endParaRPr lang="ru-RU" dirty="0"/>
+            <a:pPr marL="0" indent="0" algn="ctr">
+              <a:buNone/>
+            </a:pPr>
+            <a:r>
+              <a:rPr lang="ru-RU" sz="2000" b="1" dirty="0"/>
+              <a:t>Сила воли не работает. Пусть твое окружение работает вместо нее.</a:t>
+            </a:r>
+            <a:endParaRPr lang="en-US" sz="2000" b="1" dirty="0"/>
           </a:p>
         </p:txBody>
       </p:sp>
     </p:spTree>
     <p:extLst>
       <p:ext uri="{BB962C8B-B14F-4D97-AF65-F5344CB8AC3E}">
-        <p14:creationId xmlns:p14="http://schemas.microsoft.com/office/powerpoint/2010/main" val="846126053"/>
+        <p14:creationId xmlns:p14="http://schemas.microsoft.com/office/powerpoint/2010/main" val="3215833638"/>
       </p:ext>
     </p:extLst>
   </p:cSld>
@@ -24414,7 +24411,7 @@
 </file>
 
 <file path=ppt/slides/slide42.xml><?xml version="1.0" encoding="utf-8"?>
-<p:sld xmlns:a="http://schemas.openxmlformats.org/drawingml/2006/main" xmlns:r="http://schemas.openxmlformats.org/officeDocument/2006/relationships" xmlns:p="http://schemas.openxmlformats.org/presentationml/2006/main">
+<p:sld xmlns:a="http://schemas.openxmlformats.org/drawingml/2006/main" xmlns:r="http://schemas.openxmlformats.org/officeDocument/2006/relationships" xmlns:p="http://schemas.openxmlformats.org/presentationml/2006/main" show="0">
   <p:cSld>
     <p:spTree>
       <p:nvGrpSpPr>
@@ -24475,33 +24472,25 @@
             <p:ph idx="1"/>
           </p:nvPr>
         </p:nvSpPr>
-        <p:spPr>
-          <a:xfrm>
-            <a:off x="1154954" y="3816990"/>
-            <a:ext cx="9549397" cy="2202809"/>
-          </a:xfrm>
-        </p:spPr>
-        <p:txBody>
-          <a:bodyPr>
-            <a:normAutofit/>
-          </a:bodyPr>
+        <p:spPr/>
+        <p:txBody>
+          <a:bodyPr/>
           <a:lstStyle/>
           <a:p>
-            <a:pPr marL="0" indent="0" algn="ctr">
-              <a:buNone/>
-            </a:pPr>
-            <a:r>
-              <a:rPr lang="ru-RU" sz="2000" b="1" dirty="0"/>
-              <a:t>Сила воли не работает. Пусть твое окружение работает вместо нее.</a:t>
-            </a:r>
-            <a:endParaRPr lang="en-US" sz="2000" b="1" dirty="0"/>
+            <a:r>
+              <a:rPr lang="ru-RU" dirty="0"/>
+              <a:t>Человек – порождение ситуации.</a:t>
+            </a:r>
+          </a:p>
+          <a:p>
+            <a:endParaRPr lang="ru-RU" dirty="0"/>
           </a:p>
         </p:txBody>
       </p:sp>
     </p:spTree>
     <p:extLst>
       <p:ext uri="{BB962C8B-B14F-4D97-AF65-F5344CB8AC3E}">
-        <p14:creationId xmlns:p14="http://schemas.microsoft.com/office/powerpoint/2010/main" val="3215833638"/>
+        <p14:creationId xmlns:p14="http://schemas.microsoft.com/office/powerpoint/2010/main" val="1059165568"/>
       </p:ext>
     </p:extLst>
   </p:cSld>
@@ -24512,7 +24501,7 @@
 </file>
 
 <file path=ppt/slides/slide43.xml><?xml version="1.0" encoding="utf-8"?>
-<p:sld xmlns:a="http://schemas.openxmlformats.org/drawingml/2006/main" xmlns:r="http://schemas.openxmlformats.org/officeDocument/2006/relationships" xmlns:p="http://schemas.openxmlformats.org/presentationml/2006/main">
+<p:sld xmlns:a="http://schemas.openxmlformats.org/drawingml/2006/main" xmlns:r="http://schemas.openxmlformats.org/officeDocument/2006/relationships" xmlns:p="http://schemas.openxmlformats.org/presentationml/2006/main" show="0">
   <p:cSld>
     <p:spTree>
       <p:nvGrpSpPr>
@@ -24584,6 +24573,12 @@
             </a:r>
           </a:p>
           <a:p>
+            <a:r>
+              <a:rPr lang="ru-RU" dirty="0"/>
+              <a:t>Ваша среда формирует вас.</a:t>
+            </a:r>
+          </a:p>
+          <a:p>
             <a:endParaRPr lang="ru-RU" dirty="0"/>
           </a:p>
         </p:txBody>
@@ -24591,7 +24586,7 @@
     </p:spTree>
     <p:extLst>
       <p:ext uri="{BB962C8B-B14F-4D97-AF65-F5344CB8AC3E}">
-        <p14:creationId xmlns:p14="http://schemas.microsoft.com/office/powerpoint/2010/main" val="1059165568"/>
+        <p14:creationId xmlns:p14="http://schemas.microsoft.com/office/powerpoint/2010/main" val="2398533860"/>
       </p:ext>
     </p:extLst>
   </p:cSld>
@@ -24602,7 +24597,7 @@
 </file>
 
 <file path=ppt/slides/slide44.xml><?xml version="1.0" encoding="utf-8"?>
-<p:sld xmlns:a="http://schemas.openxmlformats.org/drawingml/2006/main" xmlns:r="http://schemas.openxmlformats.org/officeDocument/2006/relationships" xmlns:p="http://schemas.openxmlformats.org/presentationml/2006/main">
+<p:sld xmlns:a="http://schemas.openxmlformats.org/drawingml/2006/main" xmlns:r="http://schemas.openxmlformats.org/officeDocument/2006/relationships" xmlns:p="http://schemas.openxmlformats.org/presentationml/2006/main" show="0">
   <p:cSld>
     <p:spTree>
       <p:nvGrpSpPr>
@@ -24641,7 +24636,7 @@
           <a:p>
             <a:r>
               <a:rPr lang="ru-RU" dirty="0"/>
-              <a:t>Бенжамин Харди</a:t>
+              <a:t>Резюме по книге Бенжамин Харди</a:t>
             </a:r>
             <a:endParaRPr lang="en-US" dirty="0"/>
           </a:p>
@@ -24668,18 +24663,6 @@
           <a:bodyPr/>
           <a:lstStyle/>
           <a:p>
-            <a:r>
-              <a:rPr lang="ru-RU" dirty="0"/>
-              <a:t>Человек – порождение ситуации.</a:t>
-            </a:r>
-          </a:p>
-          <a:p>
-            <a:r>
-              <a:rPr lang="ru-RU" dirty="0"/>
-              <a:t>Ваша среда формирует вас.</a:t>
-            </a:r>
-          </a:p>
-          <a:p>
             <a:endParaRPr lang="ru-RU" dirty="0"/>
           </a:p>
         </p:txBody>
@@ -24687,7 +24670,7 @@
     </p:spTree>
     <p:extLst>
       <p:ext uri="{BB962C8B-B14F-4D97-AF65-F5344CB8AC3E}">
-        <p14:creationId xmlns:p14="http://schemas.microsoft.com/office/powerpoint/2010/main" val="2398533860"/>
+        <p14:creationId xmlns:p14="http://schemas.microsoft.com/office/powerpoint/2010/main" val="1409395795"/>
       </p:ext>
     </p:extLst>
   </p:cSld>
@@ -24737,7 +24720,7 @@
           <a:p>
             <a:r>
               <a:rPr lang="ru-RU" dirty="0"/>
-              <a:t>Резюме по книге Бенжамин Харди</a:t>
+              <a:t>Так есть ли Сила Воли?</a:t>
             </a:r>
             <a:endParaRPr lang="en-US" dirty="0"/>
           </a:p>
@@ -24771,7 +24754,7 @@
     </p:spTree>
     <p:extLst>
       <p:ext uri="{BB962C8B-B14F-4D97-AF65-F5344CB8AC3E}">
-        <p14:creationId xmlns:p14="http://schemas.microsoft.com/office/powerpoint/2010/main" val="1409395795"/>
+        <p14:creationId xmlns:p14="http://schemas.microsoft.com/office/powerpoint/2010/main" val="2164139279"/>
       </p:ext>
     </p:extLst>
   </p:cSld>
@@ -24782,7 +24765,7 @@
 </file>
 
 <file path=ppt/slides/slide46.xml><?xml version="1.0" encoding="utf-8"?>
-<p:sld xmlns:a="http://schemas.openxmlformats.org/drawingml/2006/main" xmlns:r="http://schemas.openxmlformats.org/officeDocument/2006/relationships" xmlns:p="http://schemas.openxmlformats.org/presentationml/2006/main">
+<p:sld xmlns:a="http://schemas.openxmlformats.org/drawingml/2006/main" xmlns:r="http://schemas.openxmlformats.org/officeDocument/2006/relationships" xmlns:p="http://schemas.openxmlformats.org/presentationml/2006/main" show="0">
   <p:cSld>
     <p:spTree>
       <p:nvGrpSpPr>
@@ -24848,14 +24831,25 @@
           <a:bodyPr/>
           <a:lstStyle/>
           <a:p>
-            <a:endParaRPr lang="ru-RU" dirty="0"/>
+            <a:r>
+              <a:rPr lang="ru-RU" dirty="0"/>
+              <a:t>Если мы под силой воли подразумеваем способность управлять самим собой (самоконтроль/дисциплина) и ходом своей жизни таким образом, что бы добиваться всех намеченных целей и реализовывать практически любые свои желания. – Ответ: </a:t>
+            </a:r>
+            <a:r>
+              <a:rPr lang="ru-RU" sz="2000" b="1" dirty="0"/>
+              <a:t>Да</a:t>
+            </a:r>
+            <a:r>
+              <a:rPr lang="ru-RU" dirty="0"/>
+              <a:t>. </a:t>
+            </a:r>
           </a:p>
         </p:txBody>
       </p:sp>
     </p:spTree>
     <p:extLst>
       <p:ext uri="{BB962C8B-B14F-4D97-AF65-F5344CB8AC3E}">
-        <p14:creationId xmlns:p14="http://schemas.microsoft.com/office/powerpoint/2010/main" val="2164139279"/>
+        <p14:creationId xmlns:p14="http://schemas.microsoft.com/office/powerpoint/2010/main" val="1046140786"/>
       </p:ext>
     </p:extLst>
   </p:cSld>
@@ -24866,7 +24860,7 @@
 </file>
 
 <file path=ppt/slides/slide47.xml><?xml version="1.0" encoding="utf-8"?>
-<p:sld xmlns:a="http://schemas.openxmlformats.org/drawingml/2006/main" xmlns:r="http://schemas.openxmlformats.org/officeDocument/2006/relationships" xmlns:p="http://schemas.openxmlformats.org/presentationml/2006/main">
+<p:sld xmlns:a="http://schemas.openxmlformats.org/drawingml/2006/main" xmlns:r="http://schemas.openxmlformats.org/officeDocument/2006/relationships" xmlns:p="http://schemas.openxmlformats.org/presentationml/2006/main" show="0">
   <p:cSld>
     <p:spTree>
       <p:nvGrpSpPr>
@@ -24929,7 +24923,9 @@
         </p:nvSpPr>
         <p:spPr/>
         <p:txBody>
-          <a:bodyPr/>
+          <a:bodyPr>
+            <a:normAutofit/>
+          </a:bodyPr>
           <a:lstStyle/>
           <a:p>
             <a:r>
@@ -24943,6 +24939,23 @@
             <a:r>
               <a:rPr lang="ru-RU" dirty="0"/>
               <a:t>. </a:t>
+            </a:r>
+          </a:p>
+          <a:p>
+            <a:endParaRPr lang="ru-RU" dirty="0"/>
+          </a:p>
+          <a:p>
+            <a:r>
+              <a:rPr lang="ru-RU" dirty="0"/>
+              <a:t>Поможет ли нам Сила Воли? – ответ: </a:t>
+            </a:r>
+            <a:r>
+              <a:rPr lang="ru-RU" sz="2000" b="1" dirty="0"/>
+              <a:t>Нет</a:t>
+            </a:r>
+            <a:r>
+              <a:rPr lang="ru-RU" b="1" dirty="0"/>
+              <a:t>.</a:t>
             </a:r>
           </a:p>
         </p:txBody>
@@ -24950,7 +24963,7 @@
     </p:spTree>
     <p:extLst>
       <p:ext uri="{BB962C8B-B14F-4D97-AF65-F5344CB8AC3E}">
-        <p14:creationId xmlns:p14="http://schemas.microsoft.com/office/powerpoint/2010/main" val="1046140786"/>
+        <p14:creationId xmlns:p14="http://schemas.microsoft.com/office/powerpoint/2010/main" val="3424737229"/>
       </p:ext>
     </p:extLst>
   </p:cSld>
@@ -25000,7 +25013,7 @@
           <a:p>
             <a:r>
               <a:rPr lang="ru-RU" dirty="0"/>
-              <a:t>Так есть ли Сила Воли?</a:t>
+              <a:t>И что мне делать?</a:t>
             </a:r>
             <a:endParaRPr lang="en-US" dirty="0"/>
           </a:p>
@@ -25022,49 +25035,24 @@
             <p:ph idx="1"/>
           </p:nvPr>
         </p:nvSpPr>
-        <p:spPr/>
-        <p:txBody>
-          <a:bodyPr>
-            <a:normAutofit/>
-          </a:bodyPr>
+        <p:spPr>
+          <a:xfrm>
+            <a:off x="1154955" y="2603500"/>
+            <a:ext cx="10077904" cy="3416300"/>
+          </a:xfrm>
+        </p:spPr>
+        <p:txBody>
+          <a:bodyPr/>
           <a:lstStyle/>
           <a:p>
-            <a:r>
-              <a:rPr lang="ru-RU" dirty="0"/>
-              <a:t>Если мы под силой воли подразумеваем способность управлять самим собой (самоконтроль/дисциплина) и ходом своей жизни таким образом, что бы добиваться всех намеченных целей и реализовывать практически любые свои желания. – Ответ: </a:t>
-            </a:r>
-            <a:r>
-              <a:rPr lang="ru-RU" sz="2000" b="1" dirty="0"/>
-              <a:t>Да</a:t>
-            </a:r>
-            <a:r>
-              <a:rPr lang="ru-RU" dirty="0"/>
-              <a:t>. </a:t>
-            </a:r>
-          </a:p>
-          <a:p>
             <a:endParaRPr lang="ru-RU" dirty="0"/>
-          </a:p>
-          <a:p>
-            <a:r>
-              <a:rPr lang="ru-RU" dirty="0"/>
-              <a:t>Поможет ли нам Сила Воли? – ответ: </a:t>
-            </a:r>
-            <a:r>
-              <a:rPr lang="ru-RU" sz="2000" b="1" dirty="0"/>
-              <a:t>Нет</a:t>
-            </a:r>
-            <a:r>
-              <a:rPr lang="ru-RU" b="1" dirty="0"/>
-              <a:t>.</a:t>
-            </a:r>
           </a:p>
         </p:txBody>
       </p:sp>
     </p:spTree>
     <p:extLst>
       <p:ext uri="{BB962C8B-B14F-4D97-AF65-F5344CB8AC3E}">
-        <p14:creationId xmlns:p14="http://schemas.microsoft.com/office/powerpoint/2010/main" val="3424737229"/>
+        <p14:creationId xmlns:p14="http://schemas.microsoft.com/office/powerpoint/2010/main" val="104215905"/>
       </p:ext>
     </p:extLst>
   </p:cSld>
@@ -25146,6 +25134,12 @@
           <a:bodyPr/>
           <a:lstStyle/>
           <a:p>
+            <a:r>
+              <a:rPr lang="ru-RU" dirty="0"/>
+              <a:t>Прислушивайся к себе. Чего ты хочешь? Какую проблему ты пытаешься решить?</a:t>
+            </a:r>
+          </a:p>
+          <a:p>
             <a:endParaRPr lang="ru-RU" dirty="0"/>
           </a:p>
         </p:txBody>
@@ -25153,7 +25147,7 @@
     </p:spTree>
     <p:extLst>
       <p:ext uri="{BB962C8B-B14F-4D97-AF65-F5344CB8AC3E}">
-        <p14:creationId xmlns:p14="http://schemas.microsoft.com/office/powerpoint/2010/main" val="104215905"/>
+        <p14:creationId xmlns:p14="http://schemas.microsoft.com/office/powerpoint/2010/main" val="4079798762"/>
       </p:ext>
     </p:extLst>
   </p:cSld>
@@ -25348,8 +25342,8 @@
         </p:nvSpPr>
         <p:spPr>
           <a:xfrm>
-            <a:off x="1154955" y="2603500"/>
-            <a:ext cx="10077904" cy="3416300"/>
+            <a:off x="1154954" y="2603500"/>
+            <a:ext cx="10279239" cy="3416300"/>
           </a:xfrm>
         </p:spPr>
         <p:txBody>
@@ -25359,6 +25353,15 @@
             <a:r>
               <a:rPr lang="ru-RU" dirty="0"/>
               <a:t>Прислушивайся к себе. Чего ты хочешь? Какую проблему ты пытаешься решить?</a:t>
+            </a:r>
+          </a:p>
+          <a:p>
+            <a:endParaRPr lang="ru-RU" dirty="0"/>
+          </a:p>
+          <a:p>
+            <a:r>
+              <a:rPr lang="ru-RU" dirty="0"/>
+              <a:t>Задавай вопросы сам себе. И пытайся найти ответы.</a:t>
             </a:r>
           </a:p>
           <a:p>
@@ -25369,7 +25372,7 @@
     </p:spTree>
     <p:extLst>
       <p:ext uri="{BB962C8B-B14F-4D97-AF65-F5344CB8AC3E}">
-        <p14:creationId xmlns:p14="http://schemas.microsoft.com/office/powerpoint/2010/main" val="4079798762"/>
+        <p14:creationId xmlns:p14="http://schemas.microsoft.com/office/powerpoint/2010/main" val="4171558127"/>
       </p:ext>
     </p:extLst>
   </p:cSld>
@@ -25444,7 +25447,7 @@
         <p:spPr>
           <a:xfrm>
             <a:off x="1154954" y="2603500"/>
-            <a:ext cx="10279239" cy="3416300"/>
+            <a:ext cx="10430241" cy="3416300"/>
           </a:xfrm>
         </p:spPr>
         <p:txBody>
@@ -25463,6 +25466,15 @@
             <a:r>
               <a:rPr lang="ru-RU" dirty="0"/>
               <a:t>Задавай вопросы сам себе. И пытайся найти ответы.</a:t>
+            </a:r>
+          </a:p>
+          <a:p>
+            <a:endParaRPr lang="ru-RU" dirty="0"/>
+          </a:p>
+          <a:p>
+            <a:r>
+              <a:rPr lang="ru-RU" dirty="0"/>
+              <a:t>Найди баланс.</a:t>
             </a:r>
           </a:p>
           <a:p>
@@ -25473,7 +25485,7 @@
     </p:spTree>
     <p:extLst>
       <p:ext uri="{BB962C8B-B14F-4D97-AF65-F5344CB8AC3E}">
-        <p14:creationId xmlns:p14="http://schemas.microsoft.com/office/powerpoint/2010/main" val="4171558127"/>
+        <p14:creationId xmlns:p14="http://schemas.microsoft.com/office/powerpoint/2010/main" val="1501391458"/>
       </p:ext>
     </p:extLst>
   </p:cSld>
@@ -25548,7 +25560,7 @@
         <p:spPr>
           <a:xfrm>
             <a:off x="1154954" y="2603500"/>
-            <a:ext cx="10430241" cy="3416300"/>
+            <a:ext cx="10312795" cy="3416300"/>
           </a:xfrm>
         </p:spPr>
         <p:txBody>
@@ -25576,6 +25588,27 @@
             <a:r>
               <a:rPr lang="ru-RU" dirty="0"/>
               <a:t>Найди баланс.</a:t>
+            </a:r>
+          </a:p>
+          <a:p>
+            <a:endParaRPr lang="ru-RU" dirty="0"/>
+          </a:p>
+          <a:p>
+            <a:r>
+              <a:rPr lang="ru-RU" dirty="0"/>
+              <a:t>Найди ту конфигурацию которая будет работать именно для тебя. Пойми что нету той </a:t>
+            </a:r>
+            <a:r>
+              <a:rPr lang="en-US" i="1" dirty="0"/>
+              <a:t>silver bullet</a:t>
+            </a:r>
+            <a:r>
+              <a:rPr lang="en-US" dirty="0"/>
+              <a:t> </a:t>
+            </a:r>
+            <a:r>
+              <a:rPr lang="ru-RU" dirty="0"/>
+              <a:t>которую все пытаются найти.</a:t>
             </a:r>
           </a:p>
           <a:p>
@@ -25586,7 +25619,7 @@
     </p:spTree>
     <p:extLst>
       <p:ext uri="{BB962C8B-B14F-4D97-AF65-F5344CB8AC3E}">
-        <p14:creationId xmlns:p14="http://schemas.microsoft.com/office/powerpoint/2010/main" val="1501391458"/>
+        <p14:creationId xmlns:p14="http://schemas.microsoft.com/office/powerpoint/2010/main" val="2916773178"/>
       </p:ext>
     </p:extLst>
   </p:cSld>
@@ -25597,7 +25630,7 @@
 </file>
 
 <file path=ppt/slides/slide53.xml><?xml version="1.0" encoding="utf-8"?>
-<p:sld xmlns:a="http://schemas.openxmlformats.org/drawingml/2006/main" xmlns:r="http://schemas.openxmlformats.org/officeDocument/2006/relationships" xmlns:p="http://schemas.openxmlformats.org/presentationml/2006/main">
+<p:sld xmlns:a="http://schemas.openxmlformats.org/drawingml/2006/main" xmlns:r="http://schemas.openxmlformats.org/officeDocument/2006/relationships" xmlns:p="http://schemas.openxmlformats.org/presentationml/2006/main" show="0">
   <p:cSld>
     <p:spTree>
       <p:nvGrpSpPr>
@@ -25629,14 +25662,27 @@
             <p:ph type="title"/>
           </p:nvPr>
         </p:nvSpPr>
-        <p:spPr/>
+        <p:spPr>
+          <a:xfrm>
+            <a:off x="1154953" y="973668"/>
+            <a:ext cx="9457120" cy="706964"/>
+          </a:xfrm>
+        </p:spPr>
         <p:txBody>
           <a:bodyPr/>
           <a:lstStyle/>
           <a:p>
             <a:r>
               <a:rPr lang="ru-RU" dirty="0"/>
-              <a:t>И что мне делать?</a:t>
+              <a:t>А</a:t>
+            </a:r>
+            <a:r>
+              <a:rPr lang="en-US" dirty="0"/>
+              <a:t> </a:t>
+            </a:r>
+            <a:r>
+              <a:rPr lang="ru-RU" dirty="0"/>
+              <a:t>зачем нам всё это?</a:t>
             </a:r>
             <a:endParaRPr lang="en-US" dirty="0"/>
           </a:p>
@@ -25658,69 +25704,22 @@
             <p:ph idx="1"/>
           </p:nvPr>
         </p:nvSpPr>
-        <p:spPr>
-          <a:xfrm>
-            <a:off x="1154954" y="2603500"/>
-            <a:ext cx="10312795" cy="3416300"/>
-          </a:xfrm>
-        </p:spPr>
+        <p:spPr/>
         <p:txBody>
           <a:bodyPr/>
           <a:lstStyle/>
           <a:p>
             <a:r>
               <a:rPr lang="ru-RU" dirty="0"/>
-              <a:t>Прислушивайся к себе. Чего ты хочешь? Какую проблему ты пытаешься решить?</a:t>
-            </a:r>
-          </a:p>
-          <a:p>
-            <a:endParaRPr lang="ru-RU" dirty="0"/>
-          </a:p>
-          <a:p>
-            <a:r>
-              <a:rPr lang="ru-RU" dirty="0"/>
-              <a:t>Задавай вопросы сам себе. И пытайся найти ответы.</a:t>
-            </a:r>
-          </a:p>
-          <a:p>
-            <a:endParaRPr lang="ru-RU" dirty="0"/>
-          </a:p>
-          <a:p>
-            <a:r>
-              <a:rPr lang="ru-RU" dirty="0"/>
-              <a:t>Найди баланс.</a:t>
-            </a:r>
-          </a:p>
-          <a:p>
-            <a:endParaRPr lang="ru-RU" dirty="0"/>
-          </a:p>
-          <a:p>
-            <a:r>
-              <a:rPr lang="ru-RU" dirty="0"/>
-              <a:t>Найди ту конфигурацию которая будет работать именно для тебя. Пойми что нету той </a:t>
-            </a:r>
-            <a:r>
-              <a:rPr lang="en-US" i="1" dirty="0"/>
-              <a:t>silver bullet</a:t>
-            </a:r>
-            <a:r>
-              <a:rPr lang="en-US" dirty="0"/>
-              <a:t> </a:t>
-            </a:r>
-            <a:r>
-              <a:rPr lang="ru-RU" dirty="0"/>
-              <a:t>которую все пытаются найти.</a:t>
-            </a:r>
-          </a:p>
-          <a:p>
-            <a:endParaRPr lang="ru-RU" dirty="0"/>
+              <a:t>Какую проблему мы вообще пытаемся решить?</a:t>
+            </a:r>
           </a:p>
         </p:txBody>
       </p:sp>
     </p:spTree>
     <p:extLst>
       <p:ext uri="{BB962C8B-B14F-4D97-AF65-F5344CB8AC3E}">
-        <p14:creationId xmlns:p14="http://schemas.microsoft.com/office/powerpoint/2010/main" val="2916773178"/>
+        <p14:creationId xmlns:p14="http://schemas.microsoft.com/office/powerpoint/2010/main" val="337745344"/>
       </p:ext>
     </p:extLst>
   </p:cSld>
@@ -25731,7 +25730,7 @@
 </file>
 
 <file path=ppt/slides/slide54.xml><?xml version="1.0" encoding="utf-8"?>
-<p:sld xmlns:a="http://schemas.openxmlformats.org/drawingml/2006/main" xmlns:r="http://schemas.openxmlformats.org/officeDocument/2006/relationships" xmlns:p="http://schemas.openxmlformats.org/presentationml/2006/main">
+<p:sld xmlns:a="http://schemas.openxmlformats.org/drawingml/2006/main" xmlns:r="http://schemas.openxmlformats.org/officeDocument/2006/relationships" xmlns:p="http://schemas.openxmlformats.org/presentationml/2006/main" show="0">
   <p:cSld>
     <p:spTree>
       <p:nvGrpSpPr>
@@ -25775,15 +25774,7 @@
           <a:p>
             <a:r>
               <a:rPr lang="ru-RU" dirty="0"/>
-              <a:t>А</a:t>
-            </a:r>
-            <a:r>
-              <a:rPr lang="en-US" dirty="0"/>
-              <a:t> </a:t>
-            </a:r>
-            <a:r>
-              <a:rPr lang="ru-RU" dirty="0"/>
-              <a:t>зачем нам всё это?</a:t>
+              <a:t>Цель</a:t>
             </a:r>
             <a:endParaRPr lang="en-US" dirty="0"/>
           </a:p>
@@ -25812,15 +25803,24 @@
           <a:p>
             <a:r>
               <a:rPr lang="ru-RU" dirty="0"/>
-              <a:t>Какую проблему мы вообще пытаемся решить?</a:t>
-            </a:r>
+              <a:t>Нету важного.</a:t>
+            </a:r>
+          </a:p>
+          <a:p>
+            <a:r>
+              <a:rPr lang="ru-RU" dirty="0"/>
+              <a:t>Нету потребного будущего.</a:t>
+            </a:r>
+          </a:p>
+          <a:p>
+            <a:endParaRPr lang="ru-RU" dirty="0"/>
           </a:p>
         </p:txBody>
       </p:sp>
     </p:spTree>
     <p:extLst>
       <p:ext uri="{BB962C8B-B14F-4D97-AF65-F5344CB8AC3E}">
-        <p14:creationId xmlns:p14="http://schemas.microsoft.com/office/powerpoint/2010/main" val="337745344"/>
+        <p14:creationId xmlns:p14="http://schemas.microsoft.com/office/powerpoint/2010/main" val="3636438701"/>
       </p:ext>
     </p:extLst>
   </p:cSld>
@@ -25863,19 +25863,14 @@
             <p:ph type="title"/>
           </p:nvPr>
         </p:nvSpPr>
-        <p:spPr>
-          <a:xfrm>
-            <a:off x="1154953" y="973668"/>
-            <a:ext cx="9457120" cy="706964"/>
-          </a:xfrm>
-        </p:spPr>
+        <p:spPr/>
         <p:txBody>
           <a:bodyPr/>
           <a:lstStyle/>
           <a:p>
             <a:r>
               <a:rPr lang="ru-RU" dirty="0"/>
-              <a:t>Цель</a:t>
+              <a:t>Советы</a:t>
             </a:r>
             <a:endParaRPr lang="en-US" dirty="0"/>
           </a:p>
@@ -25902,18 +25897,6 @@
           <a:bodyPr/>
           <a:lstStyle/>
           <a:p>
-            <a:r>
-              <a:rPr lang="ru-RU" dirty="0"/>
-              <a:t>Нету важного.</a:t>
-            </a:r>
-          </a:p>
-          <a:p>
-            <a:r>
-              <a:rPr lang="ru-RU" dirty="0"/>
-              <a:t>Нету потребного будущего.</a:t>
-            </a:r>
-          </a:p>
-          <a:p>
             <a:endParaRPr lang="ru-RU" dirty="0"/>
           </a:p>
         </p:txBody>
@@ -25921,7 +25904,7 @@
     </p:spTree>
     <p:extLst>
       <p:ext uri="{BB962C8B-B14F-4D97-AF65-F5344CB8AC3E}">
-        <p14:creationId xmlns:p14="http://schemas.microsoft.com/office/powerpoint/2010/main" val="3636438701"/>
+        <p14:creationId xmlns:p14="http://schemas.microsoft.com/office/powerpoint/2010/main" val="2746810043"/>
       </p:ext>
     </p:extLst>
   </p:cSld>
@@ -25998,6 +25981,12 @@
           <a:bodyPr/>
           <a:lstStyle/>
           <a:p>
+            <a:r>
+              <a:rPr lang="ru-RU" dirty="0"/>
+              <a:t>Спите.</a:t>
+            </a:r>
+          </a:p>
+          <a:p>
             <a:endParaRPr lang="ru-RU" dirty="0"/>
           </a:p>
         </p:txBody>
@@ -26005,7 +25994,7 @@
     </p:spTree>
     <p:extLst>
       <p:ext uri="{BB962C8B-B14F-4D97-AF65-F5344CB8AC3E}">
-        <p14:creationId xmlns:p14="http://schemas.microsoft.com/office/powerpoint/2010/main" val="2746810043"/>
+        <p14:creationId xmlns:p14="http://schemas.microsoft.com/office/powerpoint/2010/main" val="1528982406"/>
       </p:ext>
     </p:extLst>
   </p:cSld>
@@ -26088,6 +26077,12 @@
             </a:r>
           </a:p>
           <a:p>
+            <a:r>
+              <a:rPr lang="ru-RU" dirty="0"/>
+              <a:t>Практикуйте осознанность.</a:t>
+            </a:r>
+          </a:p>
+          <a:p>
             <a:endParaRPr lang="ru-RU" dirty="0"/>
           </a:p>
         </p:txBody>
@@ -26095,7 +26090,7 @@
     </p:spTree>
     <p:extLst>
       <p:ext uri="{BB962C8B-B14F-4D97-AF65-F5344CB8AC3E}">
-        <p14:creationId xmlns:p14="http://schemas.microsoft.com/office/powerpoint/2010/main" val="1528982406"/>
+        <p14:creationId xmlns:p14="http://schemas.microsoft.com/office/powerpoint/2010/main" val="2212550543"/>
       </p:ext>
     </p:extLst>
   </p:cSld>
@@ -26184,6 +26179,12 @@
             </a:r>
           </a:p>
           <a:p>
+            <a:r>
+              <a:rPr lang="ru-RU" dirty="0"/>
+              <a:t>Дневник и рефлексия.</a:t>
+            </a:r>
+          </a:p>
+          <a:p>
             <a:endParaRPr lang="ru-RU" dirty="0"/>
           </a:p>
         </p:txBody>
@@ -26191,7 +26192,7 @@
     </p:spTree>
     <p:extLst>
       <p:ext uri="{BB962C8B-B14F-4D97-AF65-F5344CB8AC3E}">
-        <p14:creationId xmlns:p14="http://schemas.microsoft.com/office/powerpoint/2010/main" val="2212550543"/>
+        <p14:creationId xmlns:p14="http://schemas.microsoft.com/office/powerpoint/2010/main" val="1994819522"/>
       </p:ext>
     </p:extLst>
   </p:cSld>
@@ -26286,6 +26287,12 @@
             </a:r>
           </a:p>
           <a:p>
+            <a:r>
+              <a:rPr lang="ru-RU" dirty="0"/>
+              <a:t>Занимайтесь медитацией.</a:t>
+            </a:r>
+          </a:p>
+          <a:p>
             <a:endParaRPr lang="ru-RU" dirty="0"/>
           </a:p>
         </p:txBody>
@@ -26293,7 +26300,7 @@
     </p:spTree>
     <p:extLst>
       <p:ext uri="{BB962C8B-B14F-4D97-AF65-F5344CB8AC3E}">
-        <p14:creationId xmlns:p14="http://schemas.microsoft.com/office/powerpoint/2010/main" val="1994819522"/>
+        <p14:creationId xmlns:p14="http://schemas.microsoft.com/office/powerpoint/2010/main" val="4166029998"/>
       </p:ext>
     </p:extLst>
   </p:cSld>
@@ -26524,6 +26531,12 @@
             </a:r>
           </a:p>
           <a:p>
+            <a:r>
+              <a:rPr lang="ru-RU" dirty="0"/>
+              <a:t>Научитесь правильно Отдыхать.</a:t>
+            </a:r>
+          </a:p>
+          <a:p>
             <a:endParaRPr lang="ru-RU" dirty="0"/>
           </a:p>
         </p:txBody>
@@ -26531,7 +26544,7 @@
     </p:spTree>
     <p:extLst>
       <p:ext uri="{BB962C8B-B14F-4D97-AF65-F5344CB8AC3E}">
-        <p14:creationId xmlns:p14="http://schemas.microsoft.com/office/powerpoint/2010/main" val="4166029998"/>
+        <p14:creationId xmlns:p14="http://schemas.microsoft.com/office/powerpoint/2010/main" val="3581029079"/>
       </p:ext>
     </p:extLst>
   </p:cSld>
@@ -26638,6 +26651,12 @@
             </a:r>
           </a:p>
           <a:p>
+            <a:r>
+              <a:rPr lang="ru-RU" dirty="0"/>
+              <a:t>Заведите ритуалы и привычки.</a:t>
+            </a:r>
+          </a:p>
+          <a:p>
             <a:endParaRPr lang="ru-RU" dirty="0"/>
           </a:p>
         </p:txBody>
@@ -26645,7 +26664,7 @@
     </p:spTree>
     <p:extLst>
       <p:ext uri="{BB962C8B-B14F-4D97-AF65-F5344CB8AC3E}">
-        <p14:creationId xmlns:p14="http://schemas.microsoft.com/office/powerpoint/2010/main" val="3581029079"/>
+        <p14:creationId xmlns:p14="http://schemas.microsoft.com/office/powerpoint/2010/main" val="914086317"/>
       </p:ext>
     </p:extLst>
   </p:cSld>
@@ -26758,6 +26777,12 @@
             </a:r>
           </a:p>
           <a:p>
+            <a:r>
+              <a:rPr lang="ru-RU" dirty="0"/>
+              <a:t>Будьте позитивны.</a:t>
+            </a:r>
+          </a:p>
+          <a:p>
             <a:endParaRPr lang="ru-RU" dirty="0"/>
           </a:p>
         </p:txBody>
@@ -26765,7 +26790,7 @@
     </p:spTree>
     <p:extLst>
       <p:ext uri="{BB962C8B-B14F-4D97-AF65-F5344CB8AC3E}">
-        <p14:creationId xmlns:p14="http://schemas.microsoft.com/office/powerpoint/2010/main" val="914086317"/>
+        <p14:creationId xmlns:p14="http://schemas.microsoft.com/office/powerpoint/2010/main" val="591118877"/>
       </p:ext>
     </p:extLst>
   </p:cSld>
@@ -26882,6 +26907,13 @@
               <a:rPr lang="ru-RU" dirty="0"/>
               <a:t>Будьте позитивны.</a:t>
             </a:r>
+            <a:endParaRPr lang="en-US" dirty="0"/>
+          </a:p>
+          <a:p>
+            <a:r>
+              <a:rPr lang="ru-RU" dirty="0"/>
+              <a:t>Занимайтесь спортом.</a:t>
+            </a:r>
           </a:p>
           <a:p>
             <a:endParaRPr lang="ru-RU" dirty="0"/>
@@ -26891,7 +26923,7 @@
     </p:spTree>
     <p:extLst>
       <p:ext uri="{BB962C8B-B14F-4D97-AF65-F5344CB8AC3E}">
-        <p14:creationId xmlns:p14="http://schemas.microsoft.com/office/powerpoint/2010/main" val="591118877"/>
+        <p14:creationId xmlns:p14="http://schemas.microsoft.com/office/powerpoint/2010/main" val="2420697594"/>
       </p:ext>
     </p:extLst>
   </p:cSld>
@@ -26941,7 +26973,7 @@
           <a:p>
             <a:r>
               <a:rPr lang="ru-RU" dirty="0"/>
-              <a:t>Советы</a:t>
+              <a:t>Резюме</a:t>
             </a:r>
             <a:endParaRPr lang="en-US" dirty="0"/>
           </a:p>
@@ -26963,68 +26995,44 @@
             <p:ph idx="1"/>
           </p:nvPr>
         </p:nvSpPr>
-        <p:spPr/>
+        <p:spPr>
+          <a:xfrm>
+            <a:off x="1154955" y="3569464"/>
+            <a:ext cx="8761412" cy="2450335"/>
+          </a:xfrm>
+        </p:spPr>
         <p:txBody>
           <a:bodyPr/>
           <a:lstStyle/>
           <a:p>
-            <a:r>
-              <a:rPr lang="ru-RU" dirty="0"/>
-              <a:t>Спите.</a:t>
-            </a:r>
-          </a:p>
-          <a:p>
-            <a:r>
-              <a:rPr lang="ru-RU" dirty="0"/>
-              <a:t>Практикуйте осознанность.</a:t>
-            </a:r>
-          </a:p>
-          <a:p>
-            <a:r>
-              <a:rPr lang="ru-RU" dirty="0"/>
-              <a:t>Дневник и рефлексия.</a:t>
-            </a:r>
-          </a:p>
-          <a:p>
-            <a:r>
-              <a:rPr lang="ru-RU" dirty="0"/>
-              <a:t>Занимайтесь медитацией.</a:t>
-            </a:r>
-          </a:p>
-          <a:p>
-            <a:r>
-              <a:rPr lang="ru-RU" dirty="0"/>
-              <a:t>Научитесь правильно Отдыхать.</a:t>
-            </a:r>
-          </a:p>
-          <a:p>
-            <a:r>
-              <a:rPr lang="ru-RU" dirty="0"/>
-              <a:t>Заведите ритуалы и привычки.</a:t>
-            </a:r>
-          </a:p>
-          <a:p>
-            <a:r>
-              <a:rPr lang="ru-RU" dirty="0"/>
-              <a:t>Будьте позитивны.</a:t>
-            </a:r>
-            <a:endParaRPr lang="en-US" dirty="0"/>
-          </a:p>
-          <a:p>
-            <a:r>
-              <a:rPr lang="ru-RU" dirty="0"/>
-              <a:t>Занимайтесь спортом.</a:t>
-            </a:r>
-          </a:p>
-          <a:p>
-            <a:endParaRPr lang="ru-RU" dirty="0"/>
+            <a:pPr marL="0" indent="0" algn="ctr">
+              <a:buNone/>
+            </a:pPr>
+            <a:r>
+              <a:rPr lang="ru-RU" sz="1800" i="1" dirty="0">
+                <a:effectLst/>
+                <a:latin typeface="Century Gothic (Body)"/>
+              </a:rPr>
+              <a:t>Сохраните мировоззрение ученого. Пробуйте новое, собирайте собственные данные, прислушивайтесь к фактам. Будьте открыты неожиданным идеям, учитесь как на собственных ошибках, так и на успехах. Берегите то, что вам помогает, и делитесь знаниями с окружающими.</a:t>
+            </a:r>
+          </a:p>
+          <a:p>
+            <a:pPr marL="0" indent="0" algn="ctr">
+              <a:buNone/>
+            </a:pPr>
+            <a:r>
+              <a:rPr lang="ru-RU" i="1" dirty="0">
+                <a:latin typeface="Century Gothic (Body)"/>
+              </a:rPr>
+              <a:t>Келли Макгонигал (с)</a:t>
+            </a:r>
           </a:p>
         </p:txBody>
       </p:sp>
     </p:spTree>
     <p:extLst>
       <p:ext uri="{BB962C8B-B14F-4D97-AF65-F5344CB8AC3E}">
-        <p14:creationId xmlns:p14="http://schemas.microsoft.com/office/powerpoint/2010/main" val="2420697594"/>
+        <p14:creationId xmlns:p14="http://schemas.microsoft.com/office/powerpoint/2010/main" val="1639902987"/>
       </p:ext>
     </p:extLst>
   </p:cSld>
@@ -27035,7 +27043,7 @@
 </file>
 
 <file path=ppt/slides/slide65.xml><?xml version="1.0" encoding="utf-8"?>
-<p:sld xmlns:a="http://schemas.openxmlformats.org/drawingml/2006/main" xmlns:r="http://schemas.openxmlformats.org/officeDocument/2006/relationships" xmlns:p="http://schemas.openxmlformats.org/presentationml/2006/main">
+<p:sld xmlns:a="http://schemas.openxmlformats.org/drawingml/2006/main" xmlns:r="http://schemas.openxmlformats.org/officeDocument/2006/relationships" xmlns:p="http://schemas.openxmlformats.org/presentationml/2006/main" show="0">
   <p:cSld>
     <p:spTree>
       <p:nvGrpSpPr>

</xml_diff>